<commit_message>
presentation file has been changed
</commit_message>
<xml_diff>
--- a/DOCKER 101.pptx
+++ b/DOCKER 101.pptx
@@ -10,32 +10,34 @@
     <p:sldId id="275" r:id="rId4"/>
     <p:sldId id="276" r:id="rId5"/>
     <p:sldId id="274" r:id="rId6"/>
-    <p:sldId id="271" r:id="rId7"/>
-    <p:sldId id="280" r:id="rId8"/>
-    <p:sldId id="272" r:id="rId9"/>
-    <p:sldId id="288" r:id="rId10"/>
-    <p:sldId id="282" r:id="rId11"/>
-    <p:sldId id="290" r:id="rId12"/>
-    <p:sldId id="283" r:id="rId13"/>
-    <p:sldId id="291" r:id="rId14"/>
-    <p:sldId id="292" r:id="rId15"/>
-    <p:sldId id="293" r:id="rId16"/>
-    <p:sldId id="285" r:id="rId17"/>
-    <p:sldId id="294" r:id="rId18"/>
-    <p:sldId id="295" r:id="rId19"/>
-    <p:sldId id="296" r:id="rId20"/>
-    <p:sldId id="286" r:id="rId21"/>
-    <p:sldId id="297" r:id="rId22"/>
-    <p:sldId id="298" r:id="rId23"/>
-    <p:sldId id="299" r:id="rId24"/>
-    <p:sldId id="284" r:id="rId25"/>
-    <p:sldId id="301" r:id="rId26"/>
-    <p:sldId id="300" r:id="rId27"/>
-    <p:sldId id="287" r:id="rId28"/>
-    <p:sldId id="302" r:id="rId29"/>
-    <p:sldId id="303" r:id="rId30"/>
-    <p:sldId id="305" r:id="rId31"/>
-    <p:sldId id="269" r:id="rId32"/>
+    <p:sldId id="307" r:id="rId7"/>
+    <p:sldId id="271" r:id="rId8"/>
+    <p:sldId id="280" r:id="rId9"/>
+    <p:sldId id="272" r:id="rId10"/>
+    <p:sldId id="288" r:id="rId11"/>
+    <p:sldId id="282" r:id="rId12"/>
+    <p:sldId id="290" r:id="rId13"/>
+    <p:sldId id="283" r:id="rId14"/>
+    <p:sldId id="291" r:id="rId15"/>
+    <p:sldId id="292" r:id="rId16"/>
+    <p:sldId id="293" r:id="rId17"/>
+    <p:sldId id="285" r:id="rId18"/>
+    <p:sldId id="294" r:id="rId19"/>
+    <p:sldId id="295" r:id="rId20"/>
+    <p:sldId id="296" r:id="rId21"/>
+    <p:sldId id="286" r:id="rId22"/>
+    <p:sldId id="297" r:id="rId23"/>
+    <p:sldId id="298" r:id="rId24"/>
+    <p:sldId id="299" r:id="rId25"/>
+    <p:sldId id="284" r:id="rId26"/>
+    <p:sldId id="301" r:id="rId27"/>
+    <p:sldId id="300" r:id="rId28"/>
+    <p:sldId id="287" r:id="rId29"/>
+    <p:sldId id="302" r:id="rId30"/>
+    <p:sldId id="303" r:id="rId31"/>
+    <p:sldId id="306" r:id="rId32"/>
+    <p:sldId id="305" r:id="rId33"/>
+    <p:sldId id="269" r:id="rId34"/>
   </p:sldIdLst>
   <p:sldSz cx="12192000" cy="6858000"/>
   <p:notesSz cx="6858000" cy="9144000"/>
@@ -4418,7 +4420,7 @@
           <a:p>
             <a:fld id="{48A87A34-81AB-432B-8DAE-1953F412C126}" type="datetimeFigureOut">
               <a:rPr lang="en-US" dirty="0"/>
-              <a:t>7/2/2018</a:t>
+              <a:t>10/20/2019</a:t>
             </a:fld>
             <a:endParaRPr lang="en-US" dirty="0"/>
           </a:p>
@@ -4476,6 +4478,30 @@
           </a:p>
         </p:txBody>
       </p:sp>
+      <p:pic>
+        <p:nvPicPr>
+          <p:cNvPr id="67" name="Picture 66"/>
+          <p:cNvPicPr>
+            <a:picLocks noChangeAspect="1"/>
+          </p:cNvPicPr>
+          <p:nvPr userDrawn="1"/>
+        </p:nvPicPr>
+        <p:blipFill>
+          <a:blip r:embed="rId3"/>
+          <a:stretch>
+            <a:fillRect/>
+          </a:stretch>
+        </p:blipFill>
+        <p:spPr>
+          <a:xfrm>
+            <a:off x="9983582" y="-6960"/>
+            <a:ext cx="2208418" cy="1561123"/>
+          </a:xfrm>
+          <a:prstGeom prst="rect">
+            <a:avLst/>
+          </a:prstGeom>
+        </p:spPr>
+      </p:pic>
     </p:spTree>
   </p:cSld>
   <p:clrMapOvr>
@@ -4680,7 +4706,7 @@
           <a:p>
             <a:fld id="{48A87A34-81AB-432B-8DAE-1953F412C126}" type="datetimeFigureOut">
               <a:rPr lang="en-US" dirty="0"/>
-              <a:t>7/2/2018</a:t>
+              <a:t>10/20/2019</a:t>
             </a:fld>
             <a:endParaRPr lang="en-US" dirty="0"/>
           </a:p>
@@ -4728,6 +4754,30 @@
           </a:p>
         </p:txBody>
       </p:sp>
+      <p:pic>
+        <p:nvPicPr>
+          <p:cNvPr id="8" name="Picture 7"/>
+          <p:cNvPicPr>
+            <a:picLocks noChangeAspect="1"/>
+          </p:cNvPicPr>
+          <p:nvPr userDrawn="1"/>
+        </p:nvPicPr>
+        <p:blipFill>
+          <a:blip r:embed="rId2"/>
+          <a:stretch>
+            <a:fillRect/>
+          </a:stretch>
+        </p:blipFill>
+        <p:spPr>
+          <a:xfrm>
+            <a:off x="9983582" y="-6960"/>
+            <a:ext cx="2208418" cy="1561123"/>
+          </a:xfrm>
+          <a:prstGeom prst="rect">
+            <a:avLst/>
+          </a:prstGeom>
+        </p:spPr>
+      </p:pic>
     </p:spTree>
   </p:cSld>
   <p:clrMapOvr>
@@ -4871,7 +4921,7 @@
           <a:p>
             <a:fld id="{48A87A34-81AB-432B-8DAE-1953F412C126}" type="datetimeFigureOut">
               <a:rPr lang="en-US" dirty="0"/>
-              <a:t>7/2/2018</a:t>
+              <a:t>10/20/2019</a:t>
             </a:fld>
             <a:endParaRPr lang="en-US" dirty="0"/>
           </a:p>
@@ -4919,6 +4969,30 @@
           </a:p>
         </p:txBody>
       </p:sp>
+      <p:pic>
+        <p:nvPicPr>
+          <p:cNvPr id="8" name="Picture 7"/>
+          <p:cNvPicPr>
+            <a:picLocks noChangeAspect="1"/>
+          </p:cNvPicPr>
+          <p:nvPr userDrawn="1"/>
+        </p:nvPicPr>
+        <p:blipFill>
+          <a:blip r:embed="rId2"/>
+          <a:stretch>
+            <a:fillRect/>
+          </a:stretch>
+        </p:blipFill>
+        <p:spPr>
+          <a:xfrm>
+            <a:off x="9983582" y="-6960"/>
+            <a:ext cx="2208418" cy="1561123"/>
+          </a:xfrm>
+          <a:prstGeom prst="rect">
+            <a:avLst/>
+          </a:prstGeom>
+        </p:spPr>
+      </p:pic>
     </p:spTree>
   </p:cSld>
   <p:clrMapOvr>
@@ -5129,7 +5203,7 @@
           <a:p>
             <a:fld id="{48A87A34-81AB-432B-8DAE-1953F412C126}" type="datetimeFigureOut">
               <a:rPr lang="en-US" dirty="0"/>
-              <a:t>7/2/2018</a:t>
+              <a:t>10/20/2019</a:t>
             </a:fld>
             <a:endParaRPr lang="en-US" dirty="0"/>
           </a:p>
@@ -5415,6 +5489,30 @@
           </a:p>
         </p:txBody>
       </p:sp>
+      <p:pic>
+        <p:nvPicPr>
+          <p:cNvPr id="10" name="Picture 9"/>
+          <p:cNvPicPr>
+            <a:picLocks noChangeAspect="1"/>
+          </p:cNvPicPr>
+          <p:nvPr userDrawn="1"/>
+        </p:nvPicPr>
+        <p:blipFill>
+          <a:blip r:embed="rId2"/>
+          <a:stretch>
+            <a:fillRect/>
+          </a:stretch>
+        </p:blipFill>
+        <p:spPr>
+          <a:xfrm>
+            <a:off x="9983582" y="-6960"/>
+            <a:ext cx="2208418" cy="1561123"/>
+          </a:xfrm>
+          <a:prstGeom prst="rect">
+            <a:avLst/>
+          </a:prstGeom>
+        </p:spPr>
+      </p:pic>
     </p:spTree>
   </p:cSld>
   <p:clrMapOvr>
@@ -5558,7 +5656,7 @@
           <a:p>
             <a:fld id="{48A87A34-81AB-432B-8DAE-1953F412C126}" type="datetimeFigureOut">
               <a:rPr lang="en-US" dirty="0"/>
-              <a:t>7/2/2018</a:t>
+              <a:t>10/20/2019</a:t>
             </a:fld>
             <a:endParaRPr lang="en-US" dirty="0"/>
           </a:p>
@@ -5606,6 +5704,30 @@
           </a:p>
         </p:txBody>
       </p:sp>
+      <p:pic>
+        <p:nvPicPr>
+          <p:cNvPr id="8" name="Picture 7"/>
+          <p:cNvPicPr>
+            <a:picLocks noChangeAspect="1"/>
+          </p:cNvPicPr>
+          <p:nvPr userDrawn="1"/>
+        </p:nvPicPr>
+        <p:blipFill>
+          <a:blip r:embed="rId2"/>
+          <a:stretch>
+            <a:fillRect/>
+          </a:stretch>
+        </p:blipFill>
+        <p:spPr>
+          <a:xfrm>
+            <a:off x="9983582" y="-6960"/>
+            <a:ext cx="2208418" cy="1561123"/>
+          </a:xfrm>
+          <a:prstGeom prst="rect">
+            <a:avLst/>
+          </a:prstGeom>
+        </p:spPr>
+      </p:pic>
     </p:spTree>
   </p:cSld>
   <p:clrMapOvr>
@@ -6099,7 +6221,7 @@
           <a:p>
             <a:fld id="{48A87A34-81AB-432B-8DAE-1953F412C126}" type="datetimeFigureOut">
               <a:rPr lang="en-US" dirty="0"/>
-              <a:t>7/2/2018</a:t>
+              <a:t>10/20/2019</a:t>
             </a:fld>
             <a:endParaRPr lang="en-US" dirty="0"/>
           </a:p>
@@ -6147,6 +6269,30 @@
           </a:p>
         </p:txBody>
       </p:sp>
+      <p:pic>
+        <p:nvPicPr>
+          <p:cNvPr id="13" name="Picture 12"/>
+          <p:cNvPicPr>
+            <a:picLocks noChangeAspect="1"/>
+          </p:cNvPicPr>
+          <p:nvPr userDrawn="1"/>
+        </p:nvPicPr>
+        <p:blipFill>
+          <a:blip r:embed="rId2"/>
+          <a:stretch>
+            <a:fillRect/>
+          </a:stretch>
+        </p:blipFill>
+        <p:spPr>
+          <a:xfrm>
+            <a:off x="9983582" y="-6960"/>
+            <a:ext cx="2208418" cy="1561123"/>
+          </a:xfrm>
+          <a:prstGeom prst="rect">
+            <a:avLst/>
+          </a:prstGeom>
+        </p:spPr>
+      </p:pic>
     </p:spTree>
   </p:cSld>
   <p:clrMapOvr>
@@ -6814,7 +6960,7 @@
           <a:p>
             <a:fld id="{48A87A34-81AB-432B-8DAE-1953F412C126}" type="datetimeFigureOut">
               <a:rPr lang="en-US" dirty="0"/>
-              <a:t>7/2/2018</a:t>
+              <a:t>10/20/2019</a:t>
             </a:fld>
             <a:endParaRPr lang="en-US" dirty="0"/>
           </a:p>
@@ -6862,6 +7008,30 @@
           </a:p>
         </p:txBody>
       </p:sp>
+      <p:pic>
+        <p:nvPicPr>
+          <p:cNvPr id="15" name="Picture 14"/>
+          <p:cNvPicPr>
+            <a:picLocks noChangeAspect="1"/>
+          </p:cNvPicPr>
+          <p:nvPr userDrawn="1"/>
+        </p:nvPicPr>
+        <p:blipFill>
+          <a:blip r:embed="rId2"/>
+          <a:stretch>
+            <a:fillRect/>
+          </a:stretch>
+        </p:blipFill>
+        <p:spPr>
+          <a:xfrm>
+            <a:off x="9983582" y="-6960"/>
+            <a:ext cx="2208418" cy="1561123"/>
+          </a:xfrm>
+          <a:prstGeom prst="rect">
+            <a:avLst/>
+          </a:prstGeom>
+        </p:spPr>
+      </p:pic>
     </p:spTree>
   </p:cSld>
   <p:clrMapOvr>
@@ -6979,7 +7149,7 @@
           <a:p>
             <a:fld id="{48A87A34-81AB-432B-8DAE-1953F412C126}" type="datetimeFigureOut">
               <a:rPr lang="en-US" dirty="0"/>
-              <a:t>7/2/2018</a:t>
+              <a:t>10/20/2019</a:t>
             </a:fld>
             <a:endParaRPr lang="en-US" dirty="0"/>
           </a:p>
@@ -7027,6 +7197,30 @@
           </a:p>
         </p:txBody>
       </p:sp>
+      <p:pic>
+        <p:nvPicPr>
+          <p:cNvPr id="7" name="Picture 6"/>
+          <p:cNvPicPr>
+            <a:picLocks noChangeAspect="1"/>
+          </p:cNvPicPr>
+          <p:nvPr userDrawn="1"/>
+        </p:nvPicPr>
+        <p:blipFill>
+          <a:blip r:embed="rId2"/>
+          <a:stretch>
+            <a:fillRect/>
+          </a:stretch>
+        </p:blipFill>
+        <p:spPr>
+          <a:xfrm>
+            <a:off x="9983582" y="-6960"/>
+            <a:ext cx="2208418" cy="1561123"/>
+          </a:xfrm>
+          <a:prstGeom prst="rect">
+            <a:avLst/>
+          </a:prstGeom>
+        </p:spPr>
+      </p:pic>
     </p:spTree>
   </p:cSld>
   <p:clrMapOvr>
@@ -7154,7 +7348,7 @@
           <a:p>
             <a:fld id="{48A87A34-81AB-432B-8DAE-1953F412C126}" type="datetimeFigureOut">
               <a:rPr lang="en-US" dirty="0"/>
-              <a:t>7/2/2018</a:t>
+              <a:t>10/20/2019</a:t>
             </a:fld>
             <a:endParaRPr lang="en-US" dirty="0"/>
           </a:p>
@@ -7202,6 +7396,30 @@
           </a:p>
         </p:txBody>
       </p:sp>
+      <p:pic>
+        <p:nvPicPr>
+          <p:cNvPr id="7" name="Picture 6"/>
+          <p:cNvPicPr>
+            <a:picLocks noChangeAspect="1"/>
+          </p:cNvPicPr>
+          <p:nvPr userDrawn="1"/>
+        </p:nvPicPr>
+        <p:blipFill>
+          <a:blip r:embed="rId2"/>
+          <a:stretch>
+            <a:fillRect/>
+          </a:stretch>
+        </p:blipFill>
+        <p:spPr>
+          <a:xfrm>
+            <a:off x="9983582" y="-6960"/>
+            <a:ext cx="2208418" cy="1561123"/>
+          </a:xfrm>
+          <a:prstGeom prst="rect">
+            <a:avLst/>
+          </a:prstGeom>
+        </p:spPr>
+      </p:pic>
     </p:spTree>
   </p:cSld>
   <p:clrMapOvr>
@@ -7319,7 +7537,7 @@
           <a:p>
             <a:fld id="{48A87A34-81AB-432B-8DAE-1953F412C126}" type="datetimeFigureOut">
               <a:rPr lang="en-US" dirty="0"/>
-              <a:t>7/2/2018</a:t>
+              <a:t>10/20/2019</a:t>
             </a:fld>
             <a:endParaRPr lang="en-US" dirty="0"/>
           </a:p>
@@ -7367,6 +7585,30 @@
           </a:p>
         </p:txBody>
       </p:sp>
+      <p:pic>
+        <p:nvPicPr>
+          <p:cNvPr id="7" name="Picture 6"/>
+          <p:cNvPicPr>
+            <a:picLocks noChangeAspect="1"/>
+          </p:cNvPicPr>
+          <p:nvPr userDrawn="1"/>
+        </p:nvPicPr>
+        <p:blipFill>
+          <a:blip r:embed="rId2"/>
+          <a:stretch>
+            <a:fillRect/>
+          </a:stretch>
+        </p:blipFill>
+        <p:spPr>
+          <a:xfrm>
+            <a:off x="9983582" y="-6960"/>
+            <a:ext cx="2208418" cy="1561123"/>
+          </a:xfrm>
+          <a:prstGeom prst="rect">
+            <a:avLst/>
+          </a:prstGeom>
+        </p:spPr>
+      </p:pic>
     </p:spTree>
   </p:cSld>
   <p:clrMapOvr>
@@ -7564,7 +7806,7 @@
           <a:p>
             <a:fld id="{48A87A34-81AB-432B-8DAE-1953F412C126}" type="datetimeFigureOut">
               <a:rPr lang="en-US" dirty="0"/>
-              <a:t>7/2/2018</a:t>
+              <a:t>10/20/2019</a:t>
             </a:fld>
             <a:endParaRPr lang="en-US" dirty="0"/>
           </a:p>
@@ -7612,6 +7854,30 @@
           </a:p>
         </p:txBody>
       </p:sp>
+      <p:pic>
+        <p:nvPicPr>
+          <p:cNvPr id="7" name="Picture 6"/>
+          <p:cNvPicPr>
+            <a:picLocks noChangeAspect="1"/>
+          </p:cNvPicPr>
+          <p:nvPr userDrawn="1"/>
+        </p:nvPicPr>
+        <p:blipFill>
+          <a:blip r:embed="rId2"/>
+          <a:stretch>
+            <a:fillRect/>
+          </a:stretch>
+        </p:blipFill>
+        <p:spPr>
+          <a:xfrm>
+            <a:off x="9983582" y="-6960"/>
+            <a:ext cx="2208418" cy="1561123"/>
+          </a:xfrm>
+          <a:prstGeom prst="rect">
+            <a:avLst/>
+          </a:prstGeom>
+        </p:spPr>
+      </p:pic>
     </p:spTree>
   </p:cSld>
   <p:clrMapOvr>
@@ -7791,7 +8057,7 @@
           <a:p>
             <a:fld id="{48A87A34-81AB-432B-8DAE-1953F412C126}" type="datetimeFigureOut">
               <a:rPr lang="en-US" dirty="0"/>
-              <a:t>7/2/2018</a:t>
+              <a:t>10/20/2019</a:t>
             </a:fld>
             <a:endParaRPr lang="en-US" dirty="0"/>
           </a:p>
@@ -7839,6 +8105,30 @@
           </a:p>
         </p:txBody>
       </p:sp>
+      <p:pic>
+        <p:nvPicPr>
+          <p:cNvPr id="8" name="Picture 7"/>
+          <p:cNvPicPr>
+            <a:picLocks noChangeAspect="1"/>
+          </p:cNvPicPr>
+          <p:nvPr userDrawn="1"/>
+        </p:nvPicPr>
+        <p:blipFill>
+          <a:blip r:embed="rId2"/>
+          <a:stretch>
+            <a:fillRect/>
+          </a:stretch>
+        </p:blipFill>
+        <p:spPr>
+          <a:xfrm>
+            <a:off x="9983582" y="-6960"/>
+            <a:ext cx="2208418" cy="1561123"/>
+          </a:xfrm>
+          <a:prstGeom prst="rect">
+            <a:avLst/>
+          </a:prstGeom>
+        </p:spPr>
+      </p:pic>
     </p:spTree>
   </p:cSld>
   <p:clrMapOvr>
@@ -8167,7 +8457,7 @@
           <a:p>
             <a:fld id="{48A87A34-81AB-432B-8DAE-1953F412C126}" type="datetimeFigureOut">
               <a:rPr lang="en-US" dirty="0"/>
-              <a:t>7/2/2018</a:t>
+              <a:t>10/20/2019</a:t>
             </a:fld>
             <a:endParaRPr lang="en-US" dirty="0"/>
           </a:p>
@@ -8215,6 +8505,30 @@
           </a:p>
         </p:txBody>
       </p:sp>
+      <p:pic>
+        <p:nvPicPr>
+          <p:cNvPr id="10" name="Picture 9"/>
+          <p:cNvPicPr>
+            <a:picLocks noChangeAspect="1"/>
+          </p:cNvPicPr>
+          <p:nvPr userDrawn="1"/>
+        </p:nvPicPr>
+        <p:blipFill>
+          <a:blip r:embed="rId2"/>
+          <a:stretch>
+            <a:fillRect/>
+          </a:stretch>
+        </p:blipFill>
+        <p:spPr>
+          <a:xfrm>
+            <a:off x="9983582" y="-6960"/>
+            <a:ext cx="2208418" cy="1561123"/>
+          </a:xfrm>
+          <a:prstGeom prst="rect">
+            <a:avLst/>
+          </a:prstGeom>
+        </p:spPr>
+      </p:pic>
     </p:spTree>
   </p:cSld>
   <p:clrMapOvr>
@@ -8280,7 +8594,7 @@
           <a:p>
             <a:fld id="{48A87A34-81AB-432B-8DAE-1953F412C126}" type="datetimeFigureOut">
               <a:rPr lang="en-US" dirty="0"/>
-              <a:t>7/2/2018</a:t>
+              <a:t>10/20/2019</a:t>
             </a:fld>
             <a:endParaRPr lang="en-US" dirty="0"/>
           </a:p>
@@ -8328,6 +8642,30 @@
           </a:p>
         </p:txBody>
       </p:sp>
+      <p:pic>
+        <p:nvPicPr>
+          <p:cNvPr id="6" name="Picture 5"/>
+          <p:cNvPicPr>
+            <a:picLocks noChangeAspect="1"/>
+          </p:cNvPicPr>
+          <p:nvPr userDrawn="1"/>
+        </p:nvPicPr>
+        <p:blipFill>
+          <a:blip r:embed="rId2"/>
+          <a:stretch>
+            <a:fillRect/>
+          </a:stretch>
+        </p:blipFill>
+        <p:spPr>
+          <a:xfrm>
+            <a:off x="9983582" y="-6960"/>
+            <a:ext cx="2208418" cy="1561123"/>
+          </a:xfrm>
+          <a:prstGeom prst="rect">
+            <a:avLst/>
+          </a:prstGeom>
+        </p:spPr>
+      </p:pic>
     </p:spTree>
   </p:cSld>
   <p:clrMapOvr>
@@ -8370,7 +8708,7 @@
           <a:p>
             <a:fld id="{48A87A34-81AB-432B-8DAE-1953F412C126}" type="datetimeFigureOut">
               <a:rPr lang="en-US" dirty="0"/>
-              <a:t>7/2/2018</a:t>
+              <a:t>10/20/2019</a:t>
             </a:fld>
             <a:endParaRPr lang="en-US" dirty="0"/>
           </a:p>
@@ -8418,6 +8756,30 @@
           </a:p>
         </p:txBody>
       </p:sp>
+      <p:pic>
+        <p:nvPicPr>
+          <p:cNvPr id="5" name="Picture 4"/>
+          <p:cNvPicPr>
+            <a:picLocks noChangeAspect="1"/>
+          </p:cNvPicPr>
+          <p:nvPr userDrawn="1"/>
+        </p:nvPicPr>
+        <p:blipFill>
+          <a:blip r:embed="rId2"/>
+          <a:stretch>
+            <a:fillRect/>
+          </a:stretch>
+        </p:blipFill>
+        <p:spPr>
+          <a:xfrm>
+            <a:off x="9983582" y="-6960"/>
+            <a:ext cx="2208418" cy="1561123"/>
+          </a:xfrm>
+          <a:prstGeom prst="rect">
+            <a:avLst/>
+          </a:prstGeom>
+        </p:spPr>
+      </p:pic>
     </p:spTree>
   </p:cSld>
   <p:clrMapOvr>
@@ -8614,7 +8976,7 @@
           <a:p>
             <a:fld id="{48A87A34-81AB-432B-8DAE-1953F412C126}" type="datetimeFigureOut">
               <a:rPr lang="en-US" dirty="0"/>
-              <a:t>7/2/2018</a:t>
+              <a:t>10/20/2019</a:t>
             </a:fld>
             <a:endParaRPr lang="en-US" dirty="0"/>
           </a:p>
@@ -8662,6 +9024,30 @@
           </a:p>
         </p:txBody>
       </p:sp>
+      <p:pic>
+        <p:nvPicPr>
+          <p:cNvPr id="8" name="Picture 7"/>
+          <p:cNvPicPr>
+            <a:picLocks noChangeAspect="1"/>
+          </p:cNvPicPr>
+          <p:nvPr userDrawn="1"/>
+        </p:nvPicPr>
+        <p:blipFill>
+          <a:blip r:embed="rId2"/>
+          <a:stretch>
+            <a:fillRect/>
+          </a:stretch>
+        </p:blipFill>
+        <p:spPr>
+          <a:xfrm>
+            <a:off x="9983582" y="-6960"/>
+            <a:ext cx="2208418" cy="1561123"/>
+          </a:xfrm>
+          <a:prstGeom prst="rect">
+            <a:avLst/>
+          </a:prstGeom>
+        </p:spPr>
+      </p:pic>
     </p:spTree>
   </p:cSld>
   <p:clrMapOvr>
@@ -8889,7 +9275,7 @@
           <a:p>
             <a:fld id="{48A87A34-81AB-432B-8DAE-1953F412C126}" type="datetimeFigureOut">
               <a:rPr lang="en-US" dirty="0"/>
-              <a:t>7/2/2018</a:t>
+              <a:t>10/20/2019</a:t>
             </a:fld>
             <a:endParaRPr lang="en-US" dirty="0"/>
           </a:p>
@@ -8937,6 +9323,30 @@
           </a:p>
         </p:txBody>
       </p:sp>
+      <p:pic>
+        <p:nvPicPr>
+          <p:cNvPr id="8" name="Picture 7"/>
+          <p:cNvPicPr>
+            <a:picLocks noChangeAspect="1"/>
+          </p:cNvPicPr>
+          <p:nvPr userDrawn="1"/>
+        </p:nvPicPr>
+        <p:blipFill>
+          <a:blip r:embed="rId2"/>
+          <a:stretch>
+            <a:fillRect/>
+          </a:stretch>
+        </p:blipFill>
+        <p:spPr>
+          <a:xfrm>
+            <a:off x="9983582" y="-6960"/>
+            <a:ext cx="2208418" cy="1561123"/>
+          </a:xfrm>
+          <a:prstGeom prst="rect">
+            <a:avLst/>
+          </a:prstGeom>
+        </p:spPr>
+      </p:pic>
     </p:spTree>
   </p:cSld>
   <p:clrMapOvr>
@@ -11962,7 +12372,7 @@
             <a:fld id="{48A87A34-81AB-432B-8DAE-1953F412C126}" type="datetimeFigureOut">
               <a:rPr lang="en-US" dirty="0"/>
               <a:pPr/>
-              <a:t>7/2/2018</a:t>
+              <a:t>10/20/2019</a:t>
             </a:fld>
             <a:endParaRPr lang="en-US" dirty="0"/>
           </a:p>
@@ -12388,7 +12798,12 @@
             <p:ph type="ctrTitle"/>
           </p:nvPr>
         </p:nvSpPr>
-        <p:spPr/>
+        <p:spPr>
+          <a:xfrm>
+            <a:off x="2109180" y="723352"/>
+            <a:ext cx="8791575" cy="881004"/>
+          </a:xfrm>
+        </p:spPr>
         <p:txBody>
           <a:bodyPr/>
           <a:lstStyle/>
@@ -12411,65 +12826,72 @@
             <p:ph type="subTitle" idx="1"/>
           </p:nvPr>
         </p:nvSpPr>
-        <p:spPr/>
+        <p:spPr>
+          <a:xfrm>
+            <a:off x="2109180" y="1604356"/>
+            <a:ext cx="4012276" cy="1205346"/>
+          </a:xfrm>
+        </p:spPr>
         <p:txBody>
           <a:bodyPr>
-            <a:normAutofit fontScale="92500" lnSpcReduction="20000"/>
+            <a:normAutofit/>
           </a:bodyPr>
           <a:lstStyle/>
           <a:p>
             <a:r>
+              <a:rPr lang="en-GB" b="1" dirty="0"/>
+              <a:t>Serdar </a:t>
+            </a:r>
+            <a:r>
               <a:rPr lang="en-GB" b="1" dirty="0" err="1"/>
-              <a:t>Serdar</a:t>
+              <a:t>mumcu</a:t>
             </a:r>
             <a:r>
               <a:rPr lang="en-GB" b="1" dirty="0"/>
               <a:t> </a:t>
             </a:r>
             <a:r>
-              <a:rPr lang="en-GB" b="1" dirty="0" err="1"/>
-              <a:t>mumcu</a:t>
-            </a:r>
-            <a:r>
-              <a:rPr lang="en-GB" b="1" dirty="0"/>
-              <a:t> </a:t>
-            </a:r>
-            <a:r>
               <a:rPr lang="en-GB" dirty="0"/>
               <a:t>(</a:t>
             </a:r>
             <a:r>
-              <a:rPr lang="en-GB" dirty="0" err="1"/>
-              <a:t>Comodo</a:t>
+              <a:rPr lang="tr-TR" dirty="0"/>
+              <a:t>ICTERRA</a:t>
             </a:r>
             <a:r>
               <a:rPr lang="en-GB" dirty="0"/>
-              <a:t> threat RESEARCH labs SOFTWARE ARCHITECT)</a:t>
-            </a:r>
-          </a:p>
-          <a:p>
+              <a:t>)</a:t>
+            </a:r>
+          </a:p>
+          <a:p>
+            <a:r>
+              <a:rPr lang="en-GB" dirty="0" err="1">
+                <a:hlinkClick r:id="rId2"/>
+              </a:rPr>
+              <a:t>Serdar.mumcu</a:t>
+            </a:r>
             <a:r>
               <a:rPr lang="en-GB" dirty="0">
                 <a:hlinkClick r:id="rId2"/>
               </a:rPr>
-              <a:t>Serdar.mumcu@comodo.com</a:t>
+              <a:t>@</a:t>
+            </a:r>
+            <a:r>
+              <a:rPr lang="tr-TR" dirty="0">
+                <a:hlinkClick r:id="rId2"/>
+              </a:rPr>
+              <a:t>ICTERRA</a:t>
+            </a:r>
+            <a:r>
+              <a:rPr lang="en-GB" dirty="0">
+                <a:hlinkClick r:id="rId2"/>
+              </a:rPr>
+              <a:t>.com</a:t>
             </a:r>
             <a:endParaRPr lang="en-GB" dirty="0"/>
           </a:p>
           <a:p>
-            <a:r>
-              <a:rPr lang="en-GB" dirty="0">
-                <a:hlinkClick r:id="rId3"/>
-              </a:rPr>
-              <a:t>https://github.com/serdarmumcu/nurddockertraining</a:t>
-            </a:r>
             <a:endParaRPr lang="en-GB" dirty="0"/>
-          </a:p>
-          <a:p>
-            <a:r>
-              <a:rPr lang="en-GB" dirty="0"/>
-              <a:t>#NURDDOCKERTRAINING </a:t>
-            </a:r>
           </a:p>
           <a:p>
             <a:endParaRPr lang="en-GB" dirty="0"/>
@@ -12478,58 +12900,28 @@
       </p:sp>
       <p:pic>
         <p:nvPicPr>
-          <p:cNvPr id="5" name="Picture 4">
-            <a:extLst>
-              <a:ext uri="{FF2B5EF4-FFF2-40B4-BE49-F238E27FC236}">
-                <a16:creationId xmlns:a16="http://schemas.microsoft.com/office/drawing/2014/main" id="{D4C1E4C4-12DF-4CA6-A9A4-B45AD57178BF}"/>
-              </a:ext>
-            </a:extLst>
-          </p:cNvPr>
+          <p:cNvPr id="7" name="Picture 6"/>
           <p:cNvPicPr>
             <a:picLocks noChangeAspect="1"/>
           </p:cNvPicPr>
           <p:nvPr/>
         </p:nvPicPr>
         <p:blipFill>
-          <a:blip r:embed="rId4"/>
+          <a:blip r:embed="rId3">
+            <a:extLst>
+              <a:ext uri="{28A0092B-C50C-407E-A947-70E740481C1C}">
+                <a14:useLocalDpi xmlns:a14="http://schemas.microsoft.com/office/drawing/2010/main" val="0"/>
+              </a:ext>
+            </a:extLst>
+          </a:blip>
           <a:stretch>
             <a:fillRect/>
           </a:stretch>
         </p:blipFill>
         <p:spPr>
           <a:xfrm>
-            <a:off x="8505972" y="4429919"/>
-            <a:ext cx="956829" cy="399555"/>
-          </a:xfrm>
-          <a:prstGeom prst="rect">
-            <a:avLst/>
-          </a:prstGeom>
-        </p:spPr>
-      </p:pic>
-      <p:pic>
-        <p:nvPicPr>
-          <p:cNvPr id="6" name="Picture 5">
-            <a:extLst>
-              <a:ext uri="{FF2B5EF4-FFF2-40B4-BE49-F238E27FC236}">
-                <a16:creationId xmlns:a16="http://schemas.microsoft.com/office/drawing/2014/main" id="{44C75074-B7EE-409D-8A80-04841BE57D3D}"/>
-              </a:ext>
-            </a:extLst>
-          </p:cNvPr>
-          <p:cNvPicPr>
-            <a:picLocks noChangeAspect="1"/>
-          </p:cNvPicPr>
-          <p:nvPr/>
-        </p:nvPicPr>
-        <p:blipFill>
-          <a:blip r:embed="rId5"/>
-          <a:stretch>
-            <a:fillRect/>
-          </a:stretch>
-        </p:blipFill>
-        <p:spPr>
-          <a:xfrm>
-            <a:off x="4638071" y="4911747"/>
-            <a:ext cx="346053" cy="346053"/>
+            <a:off x="3834939" y="2668386"/>
+            <a:ext cx="5031971" cy="3773978"/>
           </a:xfrm>
           <a:prstGeom prst="rect">
             <a:avLst/>
@@ -12583,7 +12975,11 @@
           <a:p>
             <a:r>
               <a:rPr lang="en-GB" dirty="0"/>
-              <a:t>Docker CLI</a:t>
+              <a:t>Docker </a:t>
+            </a:r>
+            <a:r>
+              <a:rPr lang="en-GB" dirty="0" err="1"/>
+              <a:t>ınstallatıon</a:t>
             </a:r>
             <a:endParaRPr lang="tr-TR" dirty="0"/>
           </a:p>
@@ -12594,7 +12990,7 @@
           <p:cNvPr id="5" name="Content Placeholder 4">
             <a:extLst>
               <a:ext uri="{FF2B5EF4-FFF2-40B4-BE49-F238E27FC236}">
-                <a16:creationId xmlns:a16="http://schemas.microsoft.com/office/drawing/2014/main" id="{16E0D661-67E9-4EBB-8D27-4881FDB37593}"/>
+                <a16:creationId xmlns:a16="http://schemas.microsoft.com/office/drawing/2014/main" id="{27C75E71-562A-4F8E-BB27-1143F98C3E85}"/>
               </a:ext>
             </a:extLst>
           </p:cNvPr>
@@ -12607,62 +13003,80 @@
         </p:nvSpPr>
         <p:spPr>
           <a:xfrm>
-            <a:off x="1141412" y="1956816"/>
-            <a:ext cx="9905999" cy="3964299"/>
+            <a:off x="1141412" y="2146300"/>
+            <a:ext cx="10191996" cy="4093182"/>
           </a:xfrm>
         </p:spPr>
         <p:txBody>
           <a:bodyPr>
-            <a:normAutofit/>
+            <a:normAutofit fontScale="92500" lnSpcReduction="20000"/>
           </a:bodyPr>
           <a:lstStyle/>
           <a:p>
             <a:r>
+              <a:rPr lang="en-US" dirty="0">
+                <a:hlinkClick r:id="rId2"/>
+              </a:rPr>
+              <a:t>https://get.docker.com/</a:t>
+            </a:r>
+            <a:endParaRPr lang="en-US" dirty="0"/>
+          </a:p>
+          <a:p>
+            <a:r>
               <a:rPr lang="en-US" dirty="0"/>
-              <a:t>docker version / docker info</a:t>
+              <a:t>Docker Hub</a:t>
             </a:r>
           </a:p>
           <a:p>
             <a:r>
               <a:rPr lang="en-US" dirty="0"/>
-              <a:t>docker / docker --help</a:t>
+              <a:t>Mac , Windows, Centos, Debian, Fedora, Ubuntu, Raspberry Pi</a:t>
             </a:r>
           </a:p>
           <a:p>
             <a:r>
               <a:rPr lang="en-US" dirty="0"/>
-              <a:t>docker container run --rm</a:t>
-            </a:r>
-          </a:p>
-          <a:p>
+              <a:t>Direct: Linux, W. Server 2016 / Indirect: Windows 10 Pro/Ent (Hyper-V), Mac (</a:t>
+            </a:r>
+            <a:r>
+              <a:rPr lang="en-US" dirty="0" err="1"/>
+              <a:t>HyperKit</a:t>
+            </a:r>
             <a:r>
               <a:rPr lang="en-US" dirty="0"/>
-              <a:t>docker image ls</a:t>
+              <a:t>)</a:t>
             </a:r>
           </a:p>
           <a:p>
             <a:r>
               <a:rPr lang="en-US" dirty="0"/>
-              <a:t>docker volume ls</a:t>
+              <a:t>Windows 7/8/8.1, Older versions of Mac or Window 10 Home (Docker Toolbox)</a:t>
             </a:r>
           </a:p>
           <a:p>
             <a:r>
               <a:rPr lang="en-US" dirty="0"/>
-              <a:t>docker </a:t>
-            </a:r>
-            <a:r>
-              <a:rPr lang="en-US" dirty="0" err="1"/>
-              <a:t>ps</a:t>
-            </a:r>
-            <a:endParaRPr lang="en-US" dirty="0"/>
+              <a:t>IaaS (AWS, Azure)</a:t>
+            </a:r>
+          </a:p>
+          <a:p>
+            <a:r>
+              <a:rPr lang="en-US" dirty="0"/>
+              <a:t>Visual Studio Code (Recommended)</a:t>
+            </a:r>
+          </a:p>
+          <a:p>
+            <a:r>
+              <a:rPr lang="en-US" dirty="0"/>
+              <a:t>https://labs.play-with-docker.com/</a:t>
+            </a:r>
           </a:p>
         </p:txBody>
       </p:sp>
     </p:spTree>
     <p:extLst>
       <p:ext uri="{BB962C8B-B14F-4D97-AF65-F5344CB8AC3E}">
-        <p14:creationId xmlns:p14="http://schemas.microsoft.com/office/powerpoint/2010/main" val="1783821920"/>
+        <p14:creationId xmlns:p14="http://schemas.microsoft.com/office/powerpoint/2010/main" val="3378640103"/>
       </p:ext>
     </p:extLst>
   </p:cSld>
@@ -12730,93 +13144,62 @@
         </p:nvSpPr>
         <p:spPr>
           <a:xfrm>
-            <a:off x="1141412" y="1813810"/>
-            <a:ext cx="10416604" cy="4212236"/>
+            <a:off x="1141412" y="1956816"/>
+            <a:ext cx="9905999" cy="3964299"/>
           </a:xfrm>
         </p:spPr>
         <p:txBody>
           <a:bodyPr>
-            <a:normAutofit fontScale="92500" lnSpcReduction="20000"/>
+            <a:normAutofit/>
           </a:bodyPr>
           <a:lstStyle/>
           <a:p>
-            <a:pPr marL="0" indent="0">
-              <a:buNone/>
-            </a:pPr>
-            <a:r>
-              <a:rPr lang="en-US" sz="3200" dirty="0"/>
-              <a:t>docker container run -p 8080:80 nginx:v1.14</a:t>
-            </a:r>
-          </a:p>
-          <a:p>
-            <a:pPr marL="0" indent="0">
-              <a:buNone/>
-            </a:pPr>
-            <a:r>
-              <a:rPr lang="en-US" sz="3200" dirty="0"/>
-              <a:t>--name</a:t>
-            </a:r>
-          </a:p>
-          <a:p>
-            <a:pPr marL="0" indent="0">
-              <a:buNone/>
-            </a:pPr>
-            <a:r>
-              <a:rPr lang="en-US" sz="3200" dirty="0"/>
-              <a:t>--detach</a:t>
-            </a:r>
-          </a:p>
-          <a:p>
-            <a:pPr marL="0" indent="0">
-              <a:buNone/>
-            </a:pPr>
-            <a:r>
-              <a:rPr lang="en-US" sz="3200" dirty="0">
-                <a:hlinkClick r:id="rId2"/>
-              </a:rPr>
-              <a:t>https://hub.docker.com/explore/</a:t>
-            </a:r>
-            <a:endParaRPr lang="en-US" sz="3200" dirty="0"/>
-          </a:p>
-          <a:p>
-            <a:pPr marL="0" indent="0">
-              <a:buNone/>
-            </a:pPr>
-            <a:r>
-              <a:rPr lang="en-US" sz="3200" dirty="0"/>
-              <a:t>docker stop</a:t>
-            </a:r>
-          </a:p>
-          <a:p>
-            <a:pPr marL="0" indent="0">
-              <a:buNone/>
-            </a:pPr>
-            <a:r>
-              <a:rPr lang="en-US" sz="3200" dirty="0"/>
-              <a:t>docker start</a:t>
-            </a:r>
-          </a:p>
-          <a:p>
-            <a:pPr marL="0" indent="0">
-              <a:buNone/>
-            </a:pPr>
-            <a:r>
-              <a:rPr lang="en-US" sz="3200" dirty="0"/>
-              <a:t>docker logs</a:t>
-            </a:r>
-          </a:p>
-          <a:p>
-            <a:pPr marL="0" indent="0">
-              <a:buNone/>
-            </a:pPr>
-            <a:endParaRPr lang="en-US" sz="3200" dirty="0"/>
+            <a:r>
+              <a:rPr lang="en-US" dirty="0"/>
+              <a:t>docker version / docker info</a:t>
+            </a:r>
+          </a:p>
+          <a:p>
+            <a:r>
+              <a:rPr lang="en-US" dirty="0"/>
+              <a:t>docker / docker --help</a:t>
+            </a:r>
+          </a:p>
+          <a:p>
+            <a:r>
+              <a:rPr lang="en-US" dirty="0"/>
+              <a:t>docker container run --rm</a:t>
+            </a:r>
+          </a:p>
+          <a:p>
+            <a:r>
+              <a:rPr lang="en-US" dirty="0"/>
+              <a:t>docker image ls</a:t>
+            </a:r>
+          </a:p>
+          <a:p>
+            <a:r>
+              <a:rPr lang="en-US" dirty="0"/>
+              <a:t>docker volume ls</a:t>
+            </a:r>
+          </a:p>
+          <a:p>
+            <a:r>
+              <a:rPr lang="en-US" dirty="0"/>
+              <a:t>docker </a:t>
+            </a:r>
+            <a:r>
+              <a:rPr lang="en-US" dirty="0" err="1"/>
+              <a:t>ps</a:t>
+            </a:r>
+            <a:endParaRPr lang="en-US" dirty="0"/>
           </a:p>
         </p:txBody>
       </p:sp>
     </p:spTree>
     <p:extLst>
       <p:ext uri="{BB962C8B-B14F-4D97-AF65-F5344CB8AC3E}">
-        <p14:creationId xmlns:p14="http://schemas.microsoft.com/office/powerpoint/2010/main" val="1255474668"/>
+        <p14:creationId xmlns:p14="http://schemas.microsoft.com/office/powerpoint/2010/main" val="1783821920"/>
       </p:ext>
     </p:extLst>
   </p:cSld>
@@ -12884,66 +13267,93 @@
         </p:nvSpPr>
         <p:spPr>
           <a:xfrm>
-            <a:off x="1141413" y="2097088"/>
-            <a:ext cx="10427133" cy="3255818"/>
+            <a:off x="1141412" y="1813810"/>
+            <a:ext cx="10416604" cy="4212236"/>
           </a:xfrm>
         </p:spPr>
         <p:txBody>
-          <a:bodyPr/>
+          <a:bodyPr>
+            <a:normAutofit fontScale="92500" lnSpcReduction="20000"/>
+          </a:bodyPr>
           <a:lstStyle/>
           <a:p>
-            <a:r>
-              <a:rPr lang="en-US" dirty="0"/>
-              <a:t>docker container just a process in the host OS</a:t>
-            </a:r>
-          </a:p>
-          <a:p>
-            <a:r>
-              <a:rPr lang="en-US" dirty="0"/>
-              <a:t>docker run --name mongo –d mongo</a:t>
-            </a:r>
-          </a:p>
-          <a:p>
-            <a:r>
-              <a:rPr lang="en-US" dirty="0"/>
-              <a:t>docker top mongo</a:t>
-            </a:r>
-          </a:p>
-          <a:p>
-            <a:r>
-              <a:rPr lang="en-US" dirty="0" err="1"/>
-              <a:t>ps</a:t>
-            </a:r>
-            <a:r>
-              <a:rPr lang="en-US" dirty="0"/>
-              <a:t> aux</a:t>
-            </a:r>
-          </a:p>
-          <a:p>
-            <a:r>
-              <a:rPr lang="en-US" dirty="0"/>
-              <a:t>docker run -it --rm --privileged --</a:t>
-            </a:r>
-            <a:r>
-              <a:rPr lang="en-US" dirty="0" err="1"/>
-              <a:t>pid</a:t>
-            </a:r>
-            <a:r>
-              <a:rPr lang="en-US" dirty="0"/>
-              <a:t>=host docker4w/</a:t>
-            </a:r>
-            <a:r>
-              <a:rPr lang="en-US" dirty="0" err="1"/>
-              <a:t>nsenter-dockerd</a:t>
-            </a:r>
-            <a:endParaRPr lang="en-US" dirty="0"/>
+            <a:pPr marL="0" indent="0">
+              <a:buNone/>
+            </a:pPr>
+            <a:r>
+              <a:rPr lang="en-US" sz="3200" dirty="0"/>
+              <a:t>docker container run -p 8080:80 nginx:v1.14</a:t>
+            </a:r>
+          </a:p>
+          <a:p>
+            <a:pPr marL="0" indent="0">
+              <a:buNone/>
+            </a:pPr>
+            <a:r>
+              <a:rPr lang="en-US" sz="3200" dirty="0"/>
+              <a:t>--name</a:t>
+            </a:r>
+          </a:p>
+          <a:p>
+            <a:pPr marL="0" indent="0">
+              <a:buNone/>
+            </a:pPr>
+            <a:r>
+              <a:rPr lang="en-US" sz="3200" dirty="0"/>
+              <a:t>--detach</a:t>
+            </a:r>
+          </a:p>
+          <a:p>
+            <a:pPr marL="0" indent="0">
+              <a:buNone/>
+            </a:pPr>
+            <a:r>
+              <a:rPr lang="en-US" sz="3200" dirty="0">
+                <a:hlinkClick r:id="rId2"/>
+              </a:rPr>
+              <a:t>https://hub.docker.com/explore/</a:t>
+            </a:r>
+            <a:endParaRPr lang="en-US" sz="3200" dirty="0"/>
+          </a:p>
+          <a:p>
+            <a:pPr marL="0" indent="0">
+              <a:buNone/>
+            </a:pPr>
+            <a:r>
+              <a:rPr lang="en-US" sz="3200" dirty="0"/>
+              <a:t>docker stop</a:t>
+            </a:r>
+          </a:p>
+          <a:p>
+            <a:pPr marL="0" indent="0">
+              <a:buNone/>
+            </a:pPr>
+            <a:r>
+              <a:rPr lang="en-US" sz="3200" dirty="0"/>
+              <a:t>docker start</a:t>
+            </a:r>
+          </a:p>
+          <a:p>
+            <a:pPr marL="0" indent="0">
+              <a:buNone/>
+            </a:pPr>
+            <a:r>
+              <a:rPr lang="en-US" sz="3200" dirty="0"/>
+              <a:t>docker logs</a:t>
+            </a:r>
+          </a:p>
+          <a:p>
+            <a:pPr marL="0" indent="0">
+              <a:buNone/>
+            </a:pPr>
+            <a:endParaRPr lang="en-US" sz="3200" dirty="0"/>
           </a:p>
         </p:txBody>
       </p:sp>
     </p:spTree>
     <p:extLst>
       <p:ext uri="{BB962C8B-B14F-4D97-AF65-F5344CB8AC3E}">
-        <p14:creationId xmlns:p14="http://schemas.microsoft.com/office/powerpoint/2010/main" val="2566328069"/>
+        <p14:creationId xmlns:p14="http://schemas.microsoft.com/office/powerpoint/2010/main" val="1255474668"/>
       </p:ext>
     </p:extLst>
   </p:cSld>
@@ -12987,15 +13397,7 @@
           <a:p>
             <a:r>
               <a:rPr lang="en-GB" dirty="0"/>
-              <a:t>Docker CLI (</a:t>
-            </a:r>
-            <a:r>
-              <a:rPr lang="en-GB" dirty="0" err="1"/>
-              <a:t>Assıgnment</a:t>
-            </a:r>
-            <a:r>
-              <a:rPr lang="en-GB" dirty="0"/>
-              <a:t>)</a:t>
+              <a:t>Docker CLI</a:t>
             </a:r>
             <a:endParaRPr lang="tr-TR" dirty="0"/>
           </a:p>
@@ -13019,8 +13421,8 @@
         </p:nvSpPr>
         <p:spPr>
           <a:xfrm>
-            <a:off x="1141412" y="2249486"/>
-            <a:ext cx="9905999" cy="3687079"/>
+            <a:off x="1141413" y="2097088"/>
+            <a:ext cx="10427133" cy="3255818"/>
           </a:xfrm>
         </p:spPr>
         <p:txBody>
@@ -13028,63 +13430,57 @@
           <a:lstStyle/>
           <a:p>
             <a:r>
-              <a:rPr lang="en-US" dirty="0">
-                <a:hlinkClick r:id="rId2"/>
-              </a:rPr>
-              <a:t>https://docs.docker.com/</a:t>
+              <a:rPr lang="en-US" dirty="0"/>
+              <a:t>docker container just a process in the host OS</a:t>
+            </a:r>
+          </a:p>
+          <a:p>
+            <a:r>
+              <a:rPr lang="en-US" dirty="0"/>
+              <a:t>docker run --name mongo –d mongo</a:t>
+            </a:r>
+          </a:p>
+          <a:p>
+            <a:r>
+              <a:rPr lang="en-US" dirty="0"/>
+              <a:t>docker top mongo</a:t>
+            </a:r>
+          </a:p>
+          <a:p>
+            <a:r>
+              <a:rPr lang="en-US" dirty="0" err="1"/>
+              <a:t>ps</a:t>
+            </a:r>
+            <a:r>
+              <a:rPr lang="en-US" dirty="0"/>
+              <a:t> aux</a:t>
+            </a:r>
+          </a:p>
+          <a:p>
+            <a:r>
+              <a:rPr lang="en-US" dirty="0"/>
+              <a:t>docker run -it --rm --privileged --</a:t>
+            </a:r>
+            <a:r>
+              <a:rPr lang="en-US" dirty="0" err="1"/>
+              <a:t>pid</a:t>
+            </a:r>
+            <a:r>
+              <a:rPr lang="en-US" dirty="0"/>
+              <a:t>=host docker4w/</a:t>
+            </a:r>
+            <a:r>
+              <a:rPr lang="en-US" dirty="0" err="1"/>
+              <a:t>nsenter-dockerd</a:t>
             </a:r>
             <a:endParaRPr lang="en-US" dirty="0"/>
-          </a:p>
-          <a:p>
-            <a:r>
-              <a:rPr lang="en-US" dirty="0"/>
-              <a:t>--help</a:t>
-            </a:r>
-          </a:p>
-          <a:p>
-            <a:r>
-              <a:rPr lang="en-US" dirty="0" err="1"/>
-              <a:t>nginx</a:t>
-            </a:r>
-            <a:r>
-              <a:rPr lang="en-US" dirty="0"/>
-              <a:t> (80:80), </a:t>
-            </a:r>
-            <a:r>
-              <a:rPr lang="en-US" dirty="0" err="1"/>
-              <a:t>postgresql</a:t>
-            </a:r>
-            <a:r>
-              <a:rPr lang="en-US" dirty="0"/>
-              <a:t> (5432:5432), </a:t>
-            </a:r>
-            <a:r>
-              <a:rPr lang="en-US" dirty="0" err="1"/>
-              <a:t>httpd</a:t>
-            </a:r>
-            <a:r>
-              <a:rPr lang="en-US" dirty="0"/>
-              <a:t> (8080:80)</a:t>
-            </a:r>
-          </a:p>
-          <a:p>
-            <a:r>
-              <a:rPr lang="en-US" dirty="0"/>
-              <a:t>use –d and –name</a:t>
-            </a:r>
-          </a:p>
-          <a:p>
-            <a:r>
-              <a:rPr lang="en-US" dirty="0"/>
-              <a:t>use -e or --env to pass POSTGRES_PASSWORD=my-secret-pw</a:t>
-            </a:r>
           </a:p>
         </p:txBody>
       </p:sp>
     </p:spTree>
     <p:extLst>
       <p:ext uri="{BB962C8B-B14F-4D97-AF65-F5344CB8AC3E}">
-        <p14:creationId xmlns:p14="http://schemas.microsoft.com/office/powerpoint/2010/main" val="1797195579"/>
+        <p14:creationId xmlns:p14="http://schemas.microsoft.com/office/powerpoint/2010/main" val="2566328069"/>
       </p:ext>
     </p:extLst>
   </p:cSld>
@@ -13128,7 +13524,15 @@
           <a:p>
             <a:r>
               <a:rPr lang="en-GB" dirty="0"/>
-              <a:t>Docker CLI</a:t>
+              <a:t>Docker CLI (</a:t>
+            </a:r>
+            <a:r>
+              <a:rPr lang="en-GB" dirty="0" err="1"/>
+              <a:t>Assıgnment</a:t>
+            </a:r>
+            <a:r>
+              <a:rPr lang="en-GB" dirty="0"/>
+              <a:t>)</a:t>
             </a:r>
             <a:endParaRPr lang="tr-TR" dirty="0"/>
           </a:p>
@@ -13161,86 +13565,55 @@
           <a:lstStyle/>
           <a:p>
             <a:r>
+              <a:rPr lang="en-US" dirty="0">
+                <a:hlinkClick r:id="rId2"/>
+              </a:rPr>
+              <a:t>https://docs.docker.com/</a:t>
+            </a:r>
+            <a:endParaRPr lang="en-US" dirty="0"/>
+          </a:p>
+          <a:p>
+            <a:r>
               <a:rPr lang="en-US" dirty="0"/>
-              <a:t>docker container top</a:t>
-            </a:r>
-          </a:p>
-          <a:p>
+              <a:t>--help</a:t>
+            </a:r>
+          </a:p>
+          <a:p>
+            <a:r>
+              <a:rPr lang="en-US" dirty="0" err="1"/>
+              <a:t>nginx</a:t>
+            </a:r>
             <a:r>
               <a:rPr lang="en-US" dirty="0"/>
-              <a:t>docker container inspect</a:t>
-            </a:r>
-          </a:p>
-          <a:p>
+              <a:t> (80:80), </a:t>
+            </a:r>
+            <a:r>
+              <a:rPr lang="en-US" dirty="0" err="1"/>
+              <a:t>postgresql</a:t>
+            </a:r>
             <a:r>
               <a:rPr lang="en-US" dirty="0"/>
-              <a:t>docker container stats</a:t>
-            </a:r>
-          </a:p>
-          <a:p>
+              <a:t> (5432:5432), </a:t>
+            </a:r>
+            <a:r>
+              <a:rPr lang="en-US" dirty="0" err="1"/>
+              <a:t>httpd</a:t>
+            </a:r>
             <a:r>
               <a:rPr lang="en-US" dirty="0"/>
-              <a:t>docker inspect proxy –format ‘{{ .</a:t>
-            </a:r>
-            <a:r>
-              <a:rPr lang="en-US" dirty="0" err="1"/>
-              <a:t>NetworkSettings.IPAddress</a:t>
-            </a:r>
+              <a:t> (8080:80)</a:t>
+            </a:r>
+          </a:p>
+          <a:p>
             <a:r>
               <a:rPr lang="en-US" dirty="0"/>
-              <a:t> }}’</a:t>
+              <a:t>use –d and –name</a:t>
             </a:r>
           </a:p>
           <a:p>
             <a:r>
               <a:rPr lang="en-US" dirty="0"/>
-              <a:t>docker run --rm </a:t>
-            </a:r>
-            <a:r>
-              <a:rPr lang="en-US" dirty="0" err="1"/>
-              <a:t>tutum</a:t>
-            </a:r>
-            <a:r>
-              <a:rPr lang="en-US" dirty="0"/>
-              <a:t>/curl </a:t>
-            </a:r>
-            <a:r>
-              <a:rPr lang="en-US" dirty="0" err="1"/>
-              <a:t>curl</a:t>
-            </a:r>
-            <a:r>
-              <a:rPr lang="en-US" dirty="0"/>
-              <a:t> &lt;</a:t>
-            </a:r>
-            <a:r>
-              <a:rPr lang="en-US" dirty="0" err="1"/>
-              <a:t>ip</a:t>
-            </a:r>
-            <a:r>
-              <a:rPr lang="en-US" dirty="0"/>
-              <a:t>-address&gt;</a:t>
-            </a:r>
-          </a:p>
-          <a:p>
-            <a:r>
-              <a:rPr lang="en-US" dirty="0"/>
-              <a:t>docker stop $(docker </a:t>
-            </a:r>
-            <a:r>
-              <a:rPr lang="en-US" dirty="0" err="1"/>
-              <a:t>ps</a:t>
-            </a:r>
-            <a:r>
-              <a:rPr lang="en-US" dirty="0"/>
-              <a:t> -</a:t>
-            </a:r>
-            <a:r>
-              <a:rPr lang="en-US" dirty="0" err="1"/>
-              <a:t>aq</a:t>
-            </a:r>
-            <a:r>
-              <a:rPr lang="en-US" dirty="0"/>
-              <a:t>)</a:t>
+              <a:t>use -e or --env to pass POSTGRES_PASSWORD=my-secret-pw</a:t>
             </a:r>
           </a:p>
         </p:txBody>
@@ -13248,7 +13621,7 @@
     </p:spTree>
     <p:extLst>
       <p:ext uri="{BB962C8B-B14F-4D97-AF65-F5344CB8AC3E}">
-        <p14:creationId xmlns:p14="http://schemas.microsoft.com/office/powerpoint/2010/main" val="1135978728"/>
+        <p14:creationId xmlns:p14="http://schemas.microsoft.com/office/powerpoint/2010/main" val="1797195579"/>
       </p:ext>
     </p:extLst>
   </p:cSld>
@@ -13321,90 +13694,98 @@
           </a:xfrm>
         </p:spPr>
         <p:txBody>
-          <a:bodyPr>
-            <a:normAutofit lnSpcReduction="10000"/>
-          </a:bodyPr>
+          <a:bodyPr/>
           <a:lstStyle/>
           <a:p>
-            <a:pPr marL="0" indent="0">
-              <a:buNone/>
-            </a:pPr>
             <a:r>
               <a:rPr lang="en-US" dirty="0"/>
-              <a:t>Getting a shell inside containers (no </a:t>
+              <a:t>docker container top</a:t>
+            </a:r>
+          </a:p>
+          <a:p>
+            <a:r>
+              <a:rPr lang="en-US" dirty="0"/>
+              <a:t>docker container inspect</a:t>
+            </a:r>
+          </a:p>
+          <a:p>
+            <a:r>
+              <a:rPr lang="en-US" dirty="0"/>
+              <a:t>docker container stats</a:t>
+            </a:r>
+          </a:p>
+          <a:p>
+            <a:r>
+              <a:rPr lang="en-US" dirty="0"/>
+              <a:t>docker inspect proxy –format ‘{{ .</a:t>
             </a:r>
             <a:r>
               <a:rPr lang="en-US" dirty="0" err="1"/>
-              <a:t>ssh</a:t>
+              <a:t>NetworkSettings.IPAddress</a:t>
             </a:r>
             <a:r>
               <a:rPr lang="en-US" dirty="0"/>
-              <a:t> needed)</a:t>
+              <a:t> }}’</a:t>
             </a:r>
           </a:p>
           <a:p>
             <a:r>
               <a:rPr lang="en-US" dirty="0"/>
-              <a:t>docker container run –it</a:t>
-            </a:r>
-          </a:p>
-          <a:p>
+              <a:t>docker run --rm </a:t>
+            </a:r>
+            <a:r>
+              <a:rPr lang="en-US" dirty="0" err="1"/>
+              <a:t>tutum</a:t>
+            </a:r>
             <a:r>
               <a:rPr lang="en-US" dirty="0"/>
-              <a:t>docker container exec –it</a:t>
-            </a:r>
-          </a:p>
-          <a:p>
+              <a:t>/curl </a:t>
+            </a:r>
+            <a:r>
+              <a:rPr lang="en-US" dirty="0" err="1"/>
+              <a:t>curl</a:t>
+            </a:r>
             <a:r>
               <a:rPr lang="en-US" dirty="0"/>
-              <a:t>docker container run –it –name proxy –p 8080:80 </a:t>
+              <a:t> &lt;</a:t>
             </a:r>
             <a:r>
               <a:rPr lang="en-US" dirty="0" err="1"/>
-              <a:t>nginx</a:t>
+              <a:t>ip</a:t>
             </a:r>
             <a:r>
               <a:rPr lang="en-US" dirty="0"/>
-              <a:t> bash</a:t>
+              <a:t>-address&gt;</a:t>
             </a:r>
           </a:p>
           <a:p>
             <a:r>
               <a:rPr lang="en-US" dirty="0"/>
-              <a:t>When you exit, container will stop since we changed the default command</a:t>
-            </a:r>
-          </a:p>
-          <a:p>
+              <a:t>docker stop $(docker </a:t>
+            </a:r>
+            <a:r>
+              <a:rPr lang="en-US" dirty="0" err="1"/>
+              <a:t>ps</a:t>
+            </a:r>
             <a:r>
               <a:rPr lang="en-US" dirty="0"/>
-              <a:t>docker container </a:t>
-            </a:r>
-            <a:r>
-              <a:rPr lang="en-US"/>
-              <a:t>start -ai </a:t>
+              <a:t> -</a:t>
+            </a:r>
+            <a:r>
+              <a:rPr lang="en-US" dirty="0" err="1"/>
+              <a:t>aq</a:t>
             </a:r>
             <a:r>
               <a:rPr lang="en-US" dirty="0"/>
-              <a:t>ubuntu</a:t>
-            </a:r>
-          </a:p>
-          <a:p>
-            <a:r>
-              <a:rPr lang="en-US" dirty="0"/>
-              <a:t>docker container run -it alpine </a:t>
-            </a:r>
-            <a:r>
-              <a:rPr lang="en-US" dirty="0" err="1"/>
-              <a:t>sh</a:t>
-            </a:r>
-            <a:endParaRPr lang="en-US" dirty="0"/>
+              <a:t>)</a:t>
+            </a:r>
           </a:p>
         </p:txBody>
       </p:sp>
     </p:spTree>
     <p:extLst>
       <p:ext uri="{BB962C8B-B14F-4D97-AF65-F5344CB8AC3E}">
-        <p14:creationId xmlns:p14="http://schemas.microsoft.com/office/powerpoint/2010/main" val="4256150192"/>
+        <p14:creationId xmlns:p14="http://schemas.microsoft.com/office/powerpoint/2010/main" val="1135978728"/>
       </p:ext>
     </p:extLst>
   </p:cSld>
@@ -13448,45 +13829,119 @@
           <a:p>
             <a:r>
               <a:rPr lang="en-GB" dirty="0"/>
-              <a:t>Docker NETWORKING</a:t>
+              <a:t>Docker CLI</a:t>
             </a:r>
             <a:endParaRPr lang="tr-TR" dirty="0"/>
           </a:p>
         </p:txBody>
       </p:sp>
-      <p:pic>
-        <p:nvPicPr>
-          <p:cNvPr id="4" name="Content Placeholder 3">
+      <p:sp>
+        <p:nvSpPr>
+          <p:cNvPr id="5" name="Content Placeholder 4">
             <a:extLst>
               <a:ext uri="{FF2B5EF4-FFF2-40B4-BE49-F238E27FC236}">
-                <a16:creationId xmlns:a16="http://schemas.microsoft.com/office/drawing/2014/main" id="{6936032D-CD3F-44B8-9B3C-1A1A2541A2D8}"/>
+                <a16:creationId xmlns:a16="http://schemas.microsoft.com/office/drawing/2014/main" id="{16E0D661-67E9-4EBB-8D27-4881FDB37593}"/>
               </a:ext>
             </a:extLst>
           </p:cNvPr>
-          <p:cNvPicPr>
-            <a:picLocks noGrp="1" noChangeAspect="1"/>
-          </p:cNvPicPr>
+          <p:cNvSpPr>
+            <a:spLocks noGrp="1"/>
+          </p:cNvSpPr>
           <p:nvPr>
             <p:ph idx="1"/>
           </p:nvPr>
-        </p:nvPicPr>
-        <p:blipFill>
-          <a:blip r:embed="rId2"/>
-          <a:stretch>
-            <a:fillRect/>
-          </a:stretch>
-        </p:blipFill>
+        </p:nvSpPr>
         <p:spPr>
           <a:xfrm>
-            <a:off x="2526867" y="1935770"/>
-            <a:ext cx="7135090" cy="4303712"/>
+            <a:off x="1141412" y="2249486"/>
+            <a:ext cx="9905999" cy="3687079"/>
           </a:xfrm>
         </p:spPr>
-      </p:pic>
+        <p:txBody>
+          <a:bodyPr>
+            <a:normAutofit lnSpcReduction="10000"/>
+          </a:bodyPr>
+          <a:lstStyle/>
+          <a:p>
+            <a:pPr marL="0" indent="0">
+              <a:buNone/>
+            </a:pPr>
+            <a:r>
+              <a:rPr lang="en-US" dirty="0"/>
+              <a:t>Getting a shell inside containers (no </a:t>
+            </a:r>
+            <a:r>
+              <a:rPr lang="en-US" dirty="0" err="1"/>
+              <a:t>ssh</a:t>
+            </a:r>
+            <a:r>
+              <a:rPr lang="en-US" dirty="0"/>
+              <a:t> needed)</a:t>
+            </a:r>
+          </a:p>
+          <a:p>
+            <a:r>
+              <a:rPr lang="en-US" dirty="0"/>
+              <a:t>docker container run –it</a:t>
+            </a:r>
+          </a:p>
+          <a:p>
+            <a:r>
+              <a:rPr lang="en-US" dirty="0"/>
+              <a:t>docker container exec –it</a:t>
+            </a:r>
+          </a:p>
+          <a:p>
+            <a:r>
+              <a:rPr lang="en-US" dirty="0"/>
+              <a:t>docker container run –it –name proxy –p 8080:80 </a:t>
+            </a:r>
+            <a:r>
+              <a:rPr lang="en-US" dirty="0" err="1"/>
+              <a:t>nginx</a:t>
+            </a:r>
+            <a:r>
+              <a:rPr lang="en-US" dirty="0"/>
+              <a:t> bash</a:t>
+            </a:r>
+          </a:p>
+          <a:p>
+            <a:r>
+              <a:rPr lang="en-US" dirty="0"/>
+              <a:t>When you exit, container will stop since we changed the default command</a:t>
+            </a:r>
+          </a:p>
+          <a:p>
+            <a:r>
+              <a:rPr lang="en-US" dirty="0"/>
+              <a:t>docker container </a:t>
+            </a:r>
+            <a:r>
+              <a:rPr lang="en-US"/>
+              <a:t>start -ai </a:t>
+            </a:r>
+            <a:r>
+              <a:rPr lang="en-US" dirty="0"/>
+              <a:t>ubuntu</a:t>
+            </a:r>
+          </a:p>
+          <a:p>
+            <a:r>
+              <a:rPr lang="en-US" dirty="0"/>
+              <a:t>docker container run -it alpine </a:t>
+            </a:r>
+            <a:r>
+              <a:rPr lang="en-US" dirty="0" err="1"/>
+              <a:t>sh</a:t>
+            </a:r>
+            <a:endParaRPr lang="en-US" dirty="0"/>
+          </a:p>
+        </p:txBody>
+      </p:sp>
     </p:spTree>
     <p:extLst>
       <p:ext uri="{BB962C8B-B14F-4D97-AF65-F5344CB8AC3E}">
-        <p14:creationId xmlns:p14="http://schemas.microsoft.com/office/powerpoint/2010/main" val="2693744816"/>
+        <p14:creationId xmlns:p14="http://schemas.microsoft.com/office/powerpoint/2010/main" val="4256150192"/>
       </p:ext>
     </p:extLst>
   </p:cSld>
@@ -13536,76 +13991,39 @@
           </a:p>
         </p:txBody>
       </p:sp>
-      <p:sp>
-        <p:nvSpPr>
-          <p:cNvPr id="5" name="Content Placeholder 4">
+      <p:pic>
+        <p:nvPicPr>
+          <p:cNvPr id="4" name="Content Placeholder 3">
             <a:extLst>
               <a:ext uri="{FF2B5EF4-FFF2-40B4-BE49-F238E27FC236}">
-                <a16:creationId xmlns:a16="http://schemas.microsoft.com/office/drawing/2014/main" id="{16E0D661-67E9-4EBB-8D27-4881FDB37593}"/>
+                <a16:creationId xmlns:a16="http://schemas.microsoft.com/office/drawing/2014/main" id="{6936032D-CD3F-44B8-9B3C-1A1A2541A2D8}"/>
               </a:ext>
             </a:extLst>
           </p:cNvPr>
-          <p:cNvSpPr>
-            <a:spLocks noGrp="1"/>
-          </p:cNvSpPr>
+          <p:cNvPicPr>
+            <a:picLocks noGrp="1" noChangeAspect="1"/>
+          </p:cNvPicPr>
           <p:nvPr>
             <p:ph idx="1"/>
           </p:nvPr>
-        </p:nvSpPr>
-        <p:spPr/>
-        <p:txBody>
-          <a:bodyPr/>
-          <a:lstStyle/>
-          <a:p>
-            <a:r>
-              <a:rPr lang="en-US" dirty="0"/>
-              <a:t>docker container run –p</a:t>
-            </a:r>
-          </a:p>
-          <a:p>
-            <a:r>
-              <a:rPr lang="en-US" dirty="0"/>
-              <a:t>docker container port &lt;container&gt;</a:t>
-            </a:r>
-          </a:p>
-          <a:p>
-            <a:r>
-              <a:rPr lang="en-US" dirty="0"/>
-              <a:t>docker network ls</a:t>
-            </a:r>
-          </a:p>
-          <a:p>
-            <a:r>
-              <a:rPr lang="en-US" dirty="0"/>
-              <a:t>Bridge, Host, None</a:t>
-            </a:r>
-          </a:p>
-          <a:p>
-            <a:r>
-              <a:rPr lang="en-US" dirty="0"/>
-              <a:t>docker network inspect bridge</a:t>
-            </a:r>
-          </a:p>
-          <a:p>
-            <a:r>
-              <a:rPr lang="en-US" dirty="0"/>
-              <a:t>docker network create </a:t>
-            </a:r>
-            <a:r>
-              <a:rPr lang="en-US" dirty="0" err="1"/>
-              <a:t>mynetwork</a:t>
-            </a:r>
-            <a:r>
-              <a:rPr lang="en-US" dirty="0"/>
-              <a:t> (--driver)</a:t>
-            </a:r>
-          </a:p>
-        </p:txBody>
-      </p:sp>
+        </p:nvPicPr>
+        <p:blipFill>
+          <a:blip r:embed="rId2"/>
+          <a:stretch>
+            <a:fillRect/>
+          </a:stretch>
+        </p:blipFill>
+        <p:spPr>
+          <a:xfrm>
+            <a:off x="2526867" y="1935770"/>
+            <a:ext cx="7135090" cy="4303712"/>
+          </a:xfrm>
+        </p:spPr>
+      </p:pic>
     </p:spTree>
     <p:extLst>
       <p:ext uri="{BB962C8B-B14F-4D97-AF65-F5344CB8AC3E}">
-        <p14:creationId xmlns:p14="http://schemas.microsoft.com/office/powerpoint/2010/main" val="2161517469"/>
+        <p14:creationId xmlns:p14="http://schemas.microsoft.com/office/powerpoint/2010/main" val="2693744816"/>
       </p:ext>
     </p:extLst>
   </p:cSld>
@@ -13671,21 +14089,44 @@
             <p:ph idx="1"/>
           </p:nvPr>
         </p:nvSpPr>
-        <p:spPr>
-          <a:xfrm>
-            <a:off x="1141412" y="1856096"/>
-            <a:ext cx="9905999" cy="4287851"/>
-          </a:xfrm>
-        </p:spPr>
+        <p:spPr/>
         <p:txBody>
-          <a:bodyPr>
-            <a:normAutofit lnSpcReduction="10000"/>
-          </a:bodyPr>
+          <a:bodyPr/>
           <a:lstStyle/>
           <a:p>
             <a:r>
               <a:rPr lang="en-US" dirty="0"/>
-              <a:t>docker container run -d --name proxy –network </a:t>
+              <a:t>docker container run –p</a:t>
+            </a:r>
+          </a:p>
+          <a:p>
+            <a:r>
+              <a:rPr lang="en-US" dirty="0"/>
+              <a:t>docker container port &lt;container&gt;</a:t>
+            </a:r>
+          </a:p>
+          <a:p>
+            <a:r>
+              <a:rPr lang="en-US" dirty="0"/>
+              <a:t>docker network ls</a:t>
+            </a:r>
+          </a:p>
+          <a:p>
+            <a:r>
+              <a:rPr lang="en-US" dirty="0"/>
+              <a:t>Bridge, Host, None</a:t>
+            </a:r>
+          </a:p>
+          <a:p>
+            <a:r>
+              <a:rPr lang="en-US" dirty="0"/>
+              <a:t>docker network inspect bridge</a:t>
+            </a:r>
+          </a:p>
+          <a:p>
+            <a:r>
+              <a:rPr lang="en-US" dirty="0"/>
+              <a:t>docker network create </a:t>
             </a:r>
             <a:r>
               <a:rPr lang="en-US" dirty="0" err="1"/>
@@ -13693,88 +14134,7 @@
             </a:r>
             <a:r>
               <a:rPr lang="en-US" dirty="0"/>
-              <a:t> </a:t>
-            </a:r>
-            <a:r>
-              <a:rPr lang="en-US" dirty="0" err="1"/>
-              <a:t>nginx</a:t>
-            </a:r>
-            <a:endParaRPr lang="en-US" dirty="0"/>
-          </a:p>
-          <a:p>
-            <a:r>
-              <a:rPr lang="en-US" dirty="0"/>
-              <a:t>docker network inspect </a:t>
-            </a:r>
-            <a:r>
-              <a:rPr lang="en-US" dirty="0" err="1"/>
-              <a:t>mynetwork</a:t>
-            </a:r>
-            <a:endParaRPr lang="en-US" dirty="0"/>
-          </a:p>
-          <a:p>
-            <a:r>
-              <a:rPr lang="en-US" dirty="0"/>
-              <a:t>docker network connect</a:t>
-            </a:r>
-          </a:p>
-          <a:p>
-            <a:r>
-              <a:rPr lang="en-US" dirty="0"/>
-              <a:t>docker network disconnect</a:t>
-            </a:r>
-          </a:p>
-          <a:p>
-            <a:r>
-              <a:rPr lang="en-US" dirty="0"/>
-              <a:t>DNS (we cannot rely on the IP Addresses)</a:t>
-            </a:r>
-          </a:p>
-          <a:p>
-            <a:r>
-              <a:rPr lang="en-US" dirty="0"/>
-              <a:t>docker container run –d --name </a:t>
-            </a:r>
-            <a:r>
-              <a:rPr lang="en-US" dirty="0" err="1"/>
-              <a:t>newproxy</a:t>
-            </a:r>
-            <a:r>
-              <a:rPr lang="en-US" dirty="0"/>
-              <a:t> --network </a:t>
-            </a:r>
-            <a:r>
-              <a:rPr lang="en-US" dirty="0" err="1"/>
-              <a:t>mynetwork</a:t>
-            </a:r>
-            <a:r>
-              <a:rPr lang="en-US" dirty="0"/>
-              <a:t> </a:t>
-            </a:r>
-            <a:r>
-              <a:rPr lang="en-US" dirty="0" err="1"/>
-              <a:t>nginx</a:t>
-            </a:r>
-            <a:endParaRPr lang="en-US" dirty="0"/>
-          </a:p>
-          <a:p>
-            <a:r>
-              <a:rPr lang="en-US" dirty="0"/>
-              <a:t>docker container exec -it </a:t>
-            </a:r>
-            <a:r>
-              <a:rPr lang="en-US" dirty="0" err="1"/>
-              <a:t>newproxy</a:t>
-            </a:r>
-            <a:r>
-              <a:rPr lang="en-US" dirty="0"/>
-              <a:t> ping proxy</a:t>
-            </a:r>
-          </a:p>
-          <a:p>
-            <a:r>
-              <a:rPr lang="en-US" dirty="0"/>
-              <a:t>--link (for default bridge network) - in docker-compose it is easier</a:t>
+              <a:t> (--driver)</a:t>
             </a:r>
           </a:p>
         </p:txBody>
@@ -13782,7 +14142,7 @@
     </p:spTree>
     <p:extLst>
       <p:ext uri="{BB962C8B-B14F-4D97-AF65-F5344CB8AC3E}">
-        <p14:creationId xmlns:p14="http://schemas.microsoft.com/office/powerpoint/2010/main" val="3295595735"/>
+        <p14:creationId xmlns:p14="http://schemas.microsoft.com/office/powerpoint/2010/main" val="2161517469"/>
       </p:ext>
     </p:extLst>
   </p:cSld>
@@ -13851,85 +14211,22 @@
         <p:spPr>
           <a:xfrm>
             <a:off x="1141412" y="1856096"/>
-            <a:ext cx="10119487" cy="4287851"/>
+            <a:ext cx="9905999" cy="4287851"/>
           </a:xfrm>
         </p:spPr>
         <p:txBody>
           <a:bodyPr>
-            <a:normAutofit/>
+            <a:normAutofit lnSpcReduction="10000"/>
           </a:bodyPr>
           <a:lstStyle/>
           <a:p>
             <a:r>
               <a:rPr lang="en-US" dirty="0"/>
-              <a:t>docker network create </a:t>
+              <a:t>docker container run -d --name proxy –network </a:t>
             </a:r>
             <a:r>
               <a:rPr lang="en-US" dirty="0" err="1"/>
-              <a:t>testnetwork</a:t>
-            </a:r>
-            <a:endParaRPr lang="en-US" dirty="0"/>
-          </a:p>
-          <a:p>
-            <a:r>
-              <a:rPr lang="en-US" dirty="0"/>
-              <a:t>docker container run –d --net </a:t>
-            </a:r>
-            <a:r>
-              <a:rPr lang="en-US" dirty="0" err="1"/>
-              <a:t>testnetwork</a:t>
-            </a:r>
-            <a:r>
-              <a:rPr lang="en-US" dirty="0"/>
-              <a:t> --net-alias </a:t>
-            </a:r>
-            <a:r>
-              <a:rPr lang="en-US" dirty="0" err="1"/>
-              <a:t>mysearch</a:t>
-            </a:r>
-            <a:r>
-              <a:rPr lang="en-US" dirty="0"/>
-              <a:t> elasticsearch:2</a:t>
-            </a:r>
-          </a:p>
-          <a:p>
-            <a:r>
-              <a:rPr lang="en-US" dirty="0"/>
-              <a:t>docker container run –d --net </a:t>
-            </a:r>
-            <a:r>
-              <a:rPr lang="en-US" dirty="0" err="1"/>
-              <a:t>testnetwork</a:t>
-            </a:r>
-            <a:r>
-              <a:rPr lang="en-US" dirty="0"/>
-              <a:t> --net-alias </a:t>
-            </a:r>
-            <a:r>
-              <a:rPr lang="en-US" dirty="0" err="1"/>
-              <a:t>mysearch</a:t>
-            </a:r>
-            <a:r>
-              <a:rPr lang="en-US" dirty="0"/>
-              <a:t> elasticsearch:2</a:t>
-            </a:r>
-          </a:p>
-          <a:p>
-            <a:r>
-              <a:rPr lang="en-US" dirty="0"/>
-              <a:t>docker container run --rm --net </a:t>
-            </a:r>
-            <a:r>
-              <a:rPr lang="en-US" dirty="0" err="1"/>
-              <a:t>testnetwork</a:t>
-            </a:r>
-            <a:r>
-              <a:rPr lang="en-US" dirty="0"/>
-              <a:t> alpine </a:t>
-            </a:r>
-            <a:r>
-              <a:rPr lang="en-US" dirty="0" err="1"/>
-              <a:t>nslookup</a:t>
+              <a:t>mynetwork</a:t>
             </a:r>
             <a:r>
               <a:rPr lang="en-US" dirty="0"/>
@@ -13937,50 +14234,92 @@
             </a:r>
             <a:r>
               <a:rPr lang="en-US" dirty="0" err="1"/>
-              <a:t>mysearch</a:t>
+              <a:t>nginx</a:t>
             </a:r>
             <a:endParaRPr lang="en-US" dirty="0"/>
           </a:p>
           <a:p>
             <a:r>
               <a:rPr lang="en-US" dirty="0"/>
-              <a:t>docker container run --rm --net </a:t>
+              <a:t>docker network inspect </a:t>
             </a:r>
             <a:r>
               <a:rPr lang="en-US" dirty="0" err="1"/>
-              <a:t>testnetwork</a:t>
-            </a:r>
+              <a:t>mynetwork</a:t>
+            </a:r>
+            <a:endParaRPr lang="en-US" dirty="0"/>
+          </a:p>
+          <a:p>
             <a:r>
               <a:rPr lang="en-US" dirty="0"/>
-              <a:t> centos </a:t>
+              <a:t>docker network connect</a:t>
+            </a:r>
+          </a:p>
+          <a:p>
+            <a:r>
+              <a:rPr lang="en-US" dirty="0"/>
+              <a:t>docker network disconnect</a:t>
+            </a:r>
+          </a:p>
+          <a:p>
+            <a:r>
+              <a:rPr lang="en-US" dirty="0"/>
+              <a:t>DNS (we cannot rely on the IP Addresses)</a:t>
+            </a:r>
+          </a:p>
+          <a:p>
+            <a:r>
+              <a:rPr lang="en-US" dirty="0"/>
+              <a:t>docker container run –d --name </a:t>
             </a:r>
             <a:r>
               <a:rPr lang="en-US" dirty="0" err="1"/>
-              <a:t>centos</a:t>
+              <a:t>newproxy</a:t>
             </a:r>
             <a:r>
               <a:rPr lang="en-US" dirty="0"/>
-              <a:t> curl –s mysearch:9200</a:t>
-            </a:r>
-          </a:p>
-          <a:p>
+              <a:t> --network </a:t>
+            </a:r>
+            <a:r>
+              <a:rPr lang="en-US" dirty="0" err="1"/>
+              <a:t>mynetwork</a:t>
+            </a:r>
+            <a:r>
+              <a:rPr lang="en-US" dirty="0"/>
+              <a:t> </a:t>
+            </a:r>
+            <a:r>
+              <a:rPr lang="en-US" dirty="0" err="1"/>
+              <a:t>nginx</a:t>
+            </a:r>
             <a:endParaRPr lang="en-US" dirty="0"/>
           </a:p>
           <a:p>
-            <a:pPr marL="0" indent="0">
-              <a:buNone/>
-            </a:pPr>
-            <a:endParaRPr lang="en-US" dirty="0"/>
-          </a:p>
-          <a:p>
-            <a:endParaRPr lang="en-US" dirty="0"/>
+            <a:r>
+              <a:rPr lang="en-US" dirty="0"/>
+              <a:t>docker container exec -it </a:t>
+            </a:r>
+            <a:r>
+              <a:rPr lang="en-US" dirty="0" err="1"/>
+              <a:t>newproxy</a:t>
+            </a:r>
+            <a:r>
+              <a:rPr lang="en-US" dirty="0"/>
+              <a:t> ping proxy</a:t>
+            </a:r>
+          </a:p>
+          <a:p>
+            <a:r>
+              <a:rPr lang="en-US" dirty="0"/>
+              <a:t>--link (for default bridge network) - in docker-compose it is easier</a:t>
+            </a:r>
           </a:p>
         </p:txBody>
       </p:sp>
     </p:spTree>
     <p:extLst>
       <p:ext uri="{BB962C8B-B14F-4D97-AF65-F5344CB8AC3E}">
-        <p14:creationId xmlns:p14="http://schemas.microsoft.com/office/powerpoint/2010/main" val="36081972"/>
+        <p14:creationId xmlns:p14="http://schemas.microsoft.com/office/powerpoint/2010/main" val="3295595735"/>
       </p:ext>
     </p:extLst>
   </p:cSld>
@@ -14091,6 +14430,14 @@
               <a:rPr lang="en-US" dirty="0"/>
               <a:t>What is Docker?</a:t>
             </a:r>
+            <a:endParaRPr lang="tr-TR" dirty="0"/>
+          </a:p>
+          <a:p>
+            <a:r>
+              <a:rPr lang="tr-TR" dirty="0"/>
+              <a:t>Docker Benefits</a:t>
+            </a:r>
+            <a:endParaRPr lang="en-US" dirty="0"/>
           </a:p>
           <a:p>
             <a:r>
@@ -14121,15 +14468,6 @@
               <a:rPr lang="en-US" dirty="0"/>
               <a:t>Docker Networking</a:t>
             </a:r>
-          </a:p>
-          <a:p>
-            <a:r>
-              <a:rPr lang="en-US" dirty="0"/>
-              <a:t>Custom Docker Images</a:t>
-            </a:r>
-          </a:p>
-          <a:p>
-            <a:endParaRPr lang="tr-TR" dirty="0"/>
           </a:p>
         </p:txBody>
       </p:sp>
@@ -14147,6 +14485,204 @@
 </file>
 
 <file path=ppt/slides/slide20.xml><?xml version="1.0" encoding="utf-8"?>
+<p:sld xmlns:a="http://schemas.openxmlformats.org/drawingml/2006/main" xmlns:r="http://schemas.openxmlformats.org/officeDocument/2006/relationships" xmlns:p="http://schemas.openxmlformats.org/presentationml/2006/main">
+  <p:cSld>
+    <p:spTree>
+      <p:nvGrpSpPr>
+        <p:cNvPr id="1" name=""/>
+        <p:cNvGrpSpPr/>
+        <p:nvPr/>
+      </p:nvGrpSpPr>
+      <p:grpSpPr>
+        <a:xfrm>
+          <a:off x="0" y="0"/>
+          <a:ext cx="0" cy="0"/>
+          <a:chOff x="0" y="0"/>
+          <a:chExt cx="0" cy="0"/>
+        </a:xfrm>
+      </p:grpSpPr>
+      <p:sp>
+        <p:nvSpPr>
+          <p:cNvPr id="2" name="Title 1"/>
+          <p:cNvSpPr>
+            <a:spLocks noGrp="1"/>
+          </p:cNvSpPr>
+          <p:nvPr>
+            <p:ph type="title"/>
+          </p:nvPr>
+        </p:nvSpPr>
+        <p:spPr/>
+        <p:txBody>
+          <a:bodyPr/>
+          <a:lstStyle/>
+          <a:p>
+            <a:r>
+              <a:rPr lang="en-GB" dirty="0"/>
+              <a:t>Docker NETWORKING</a:t>
+            </a:r>
+            <a:endParaRPr lang="tr-TR" dirty="0"/>
+          </a:p>
+        </p:txBody>
+      </p:sp>
+      <p:sp>
+        <p:nvSpPr>
+          <p:cNvPr id="5" name="Content Placeholder 4">
+            <a:extLst>
+              <a:ext uri="{FF2B5EF4-FFF2-40B4-BE49-F238E27FC236}">
+                <a16:creationId xmlns:a16="http://schemas.microsoft.com/office/drawing/2014/main" id="{16E0D661-67E9-4EBB-8D27-4881FDB37593}"/>
+              </a:ext>
+            </a:extLst>
+          </p:cNvPr>
+          <p:cNvSpPr>
+            <a:spLocks noGrp="1"/>
+          </p:cNvSpPr>
+          <p:nvPr>
+            <p:ph idx="1"/>
+          </p:nvPr>
+        </p:nvSpPr>
+        <p:spPr>
+          <a:xfrm>
+            <a:off x="1141412" y="1856096"/>
+            <a:ext cx="10119487" cy="4287851"/>
+          </a:xfrm>
+        </p:spPr>
+        <p:txBody>
+          <a:bodyPr>
+            <a:normAutofit/>
+          </a:bodyPr>
+          <a:lstStyle/>
+          <a:p>
+            <a:r>
+              <a:rPr lang="en-US" dirty="0"/>
+              <a:t>docker network create </a:t>
+            </a:r>
+            <a:r>
+              <a:rPr lang="en-US" dirty="0" err="1"/>
+              <a:t>testnetwork</a:t>
+            </a:r>
+            <a:endParaRPr lang="en-US" dirty="0"/>
+          </a:p>
+          <a:p>
+            <a:r>
+              <a:rPr lang="en-US" dirty="0"/>
+              <a:t>docker container run –d --net </a:t>
+            </a:r>
+            <a:r>
+              <a:rPr lang="en-US" dirty="0" err="1"/>
+              <a:t>testnetwork</a:t>
+            </a:r>
+            <a:r>
+              <a:rPr lang="en-US" dirty="0"/>
+              <a:t> --net-alias </a:t>
+            </a:r>
+            <a:r>
+              <a:rPr lang="en-US" dirty="0" err="1"/>
+              <a:t>mysearch</a:t>
+            </a:r>
+            <a:r>
+              <a:rPr lang="en-US" dirty="0"/>
+              <a:t> elasticsearch:2</a:t>
+            </a:r>
+          </a:p>
+          <a:p>
+            <a:r>
+              <a:rPr lang="en-US" dirty="0"/>
+              <a:t>docker container run –d --net </a:t>
+            </a:r>
+            <a:r>
+              <a:rPr lang="en-US" dirty="0" err="1"/>
+              <a:t>testnetwork</a:t>
+            </a:r>
+            <a:r>
+              <a:rPr lang="en-US" dirty="0"/>
+              <a:t> --net-alias </a:t>
+            </a:r>
+            <a:r>
+              <a:rPr lang="en-US" dirty="0" err="1"/>
+              <a:t>mysearch</a:t>
+            </a:r>
+            <a:r>
+              <a:rPr lang="en-US" dirty="0"/>
+              <a:t> elasticsearch:2</a:t>
+            </a:r>
+          </a:p>
+          <a:p>
+            <a:r>
+              <a:rPr lang="en-US" dirty="0"/>
+              <a:t>docker container run --rm --net </a:t>
+            </a:r>
+            <a:r>
+              <a:rPr lang="en-US" dirty="0" err="1"/>
+              <a:t>testnetwork</a:t>
+            </a:r>
+            <a:r>
+              <a:rPr lang="en-US" dirty="0"/>
+              <a:t> alpine </a:t>
+            </a:r>
+            <a:r>
+              <a:rPr lang="en-US" dirty="0" err="1"/>
+              <a:t>nslookup</a:t>
+            </a:r>
+            <a:r>
+              <a:rPr lang="en-US" dirty="0"/>
+              <a:t> </a:t>
+            </a:r>
+            <a:r>
+              <a:rPr lang="en-US" dirty="0" err="1"/>
+              <a:t>mysearch</a:t>
+            </a:r>
+            <a:endParaRPr lang="en-US" dirty="0"/>
+          </a:p>
+          <a:p>
+            <a:r>
+              <a:rPr lang="en-US" dirty="0"/>
+              <a:t>docker container run --rm --net </a:t>
+            </a:r>
+            <a:r>
+              <a:rPr lang="en-US" dirty="0" err="1"/>
+              <a:t>testnetwork</a:t>
+            </a:r>
+            <a:r>
+              <a:rPr lang="en-US" dirty="0"/>
+              <a:t> centos </a:t>
+            </a:r>
+            <a:r>
+              <a:rPr lang="en-US" dirty="0" err="1"/>
+              <a:t>centos</a:t>
+            </a:r>
+            <a:r>
+              <a:rPr lang="en-US" dirty="0"/>
+              <a:t> curl –s mysearch:9200</a:t>
+            </a:r>
+          </a:p>
+          <a:p>
+            <a:endParaRPr lang="en-US" dirty="0"/>
+          </a:p>
+          <a:p>
+            <a:pPr marL="0" indent="0">
+              <a:buNone/>
+            </a:pPr>
+            <a:endParaRPr lang="en-US" dirty="0"/>
+          </a:p>
+          <a:p>
+            <a:endParaRPr lang="en-US" dirty="0"/>
+          </a:p>
+        </p:txBody>
+      </p:sp>
+    </p:spTree>
+    <p:extLst>
+      <p:ext uri="{BB962C8B-B14F-4D97-AF65-F5344CB8AC3E}">
+        <p14:creationId xmlns:p14="http://schemas.microsoft.com/office/powerpoint/2010/main" val="36081972"/>
+      </p:ext>
+    </p:extLst>
+  </p:cSld>
+  <p:clrMapOvr>
+    <a:masterClrMapping/>
+  </p:clrMapOvr>
+</p:sld>
+</file>
+
+<file path=ppt/slides/slide21.xml><?xml version="1.0" encoding="utf-8"?>
 <p:sld xmlns:a="http://schemas.openxmlformats.org/drawingml/2006/main" xmlns:r="http://schemas.openxmlformats.org/officeDocument/2006/relationships" xmlns:p="http://schemas.openxmlformats.org/presentationml/2006/main">
   <p:cSld>
     <p:spTree>
@@ -14277,7 +14813,7 @@
 </p:sld>
 </file>
 
-<file path=ppt/slides/slide21.xml><?xml version="1.0" encoding="utf-8"?>
+<file path=ppt/slides/slide22.xml><?xml version="1.0" encoding="utf-8"?>
 <p:sld xmlns:a="http://schemas.openxmlformats.org/drawingml/2006/main" xmlns:r="http://schemas.openxmlformats.org/officeDocument/2006/relationships" xmlns:p="http://schemas.openxmlformats.org/presentationml/2006/main">
   <p:cSld>
     <p:spTree>
@@ -14427,122 +14963,6 @@
 </p:sld>
 </file>
 
-<file path=ppt/slides/slide22.xml><?xml version="1.0" encoding="utf-8"?>
-<p:sld xmlns:a="http://schemas.openxmlformats.org/drawingml/2006/main" xmlns:r="http://schemas.openxmlformats.org/officeDocument/2006/relationships" xmlns:p="http://schemas.openxmlformats.org/presentationml/2006/main">
-  <p:cSld>
-    <p:spTree>
-      <p:nvGrpSpPr>
-        <p:cNvPr id="1" name=""/>
-        <p:cNvGrpSpPr/>
-        <p:nvPr/>
-      </p:nvGrpSpPr>
-      <p:grpSpPr>
-        <a:xfrm>
-          <a:off x="0" y="0"/>
-          <a:ext cx="0" cy="0"/>
-          <a:chOff x="0" y="0"/>
-          <a:chExt cx="0" cy="0"/>
-        </a:xfrm>
-      </p:grpSpPr>
-      <p:sp>
-        <p:nvSpPr>
-          <p:cNvPr id="2" name="Title 1"/>
-          <p:cNvSpPr>
-            <a:spLocks noGrp="1"/>
-          </p:cNvSpPr>
-          <p:nvPr>
-            <p:ph type="title"/>
-          </p:nvPr>
-        </p:nvSpPr>
-        <p:spPr/>
-        <p:txBody>
-          <a:bodyPr/>
-          <a:lstStyle/>
-          <a:p>
-            <a:r>
-              <a:rPr lang="en-GB" dirty="0"/>
-              <a:t>DOCKERFILE: CREATING CUSTOM DOCKER IMAGES</a:t>
-            </a:r>
-            <a:endParaRPr lang="tr-TR" dirty="0"/>
-          </a:p>
-        </p:txBody>
-      </p:sp>
-      <p:sp>
-        <p:nvSpPr>
-          <p:cNvPr id="5" name="Content Placeholder 4">
-            <a:extLst>
-              <a:ext uri="{FF2B5EF4-FFF2-40B4-BE49-F238E27FC236}">
-                <a16:creationId xmlns:a16="http://schemas.microsoft.com/office/drawing/2014/main" id="{16E0D661-67E9-4EBB-8D27-4881FDB37593}"/>
-              </a:ext>
-            </a:extLst>
-          </p:cNvPr>
-          <p:cNvSpPr>
-            <a:spLocks noGrp="1"/>
-          </p:cNvSpPr>
-          <p:nvPr>
-            <p:ph idx="1"/>
-          </p:nvPr>
-        </p:nvSpPr>
-        <p:spPr/>
-        <p:txBody>
-          <a:bodyPr>
-            <a:normAutofit/>
-          </a:bodyPr>
-          <a:lstStyle/>
-          <a:p>
-            <a:pPr marL="0" indent="0">
-              <a:buNone/>
-            </a:pPr>
-            <a:r>
-              <a:rPr lang="en-US" dirty="0"/>
-              <a:t>		</a:t>
-            </a:r>
-          </a:p>
-          <a:p>
-            <a:pPr marL="0" indent="0">
-              <a:buNone/>
-            </a:pPr>
-            <a:r>
-              <a:rPr lang="en-US" dirty="0"/>
-              <a:t>		</a:t>
-            </a:r>
-          </a:p>
-          <a:p>
-            <a:pPr marL="0" indent="0">
-              <a:buNone/>
-            </a:pPr>
-            <a:r>
-              <a:rPr lang="en-US" dirty="0"/>
-              <a:t>	   </a:t>
-            </a:r>
-            <a:r>
-              <a:rPr lang="en-US" sz="3600" dirty="0"/>
-              <a:t>docker image build –t </a:t>
-            </a:r>
-            <a:r>
-              <a:rPr lang="en-US" sz="3600" dirty="0" err="1"/>
-              <a:t>customnginx</a:t>
-            </a:r>
-            <a:r>
-              <a:rPr lang="en-US" sz="3600" dirty="0"/>
-              <a:t> .</a:t>
-            </a:r>
-          </a:p>
-        </p:txBody>
-      </p:sp>
-    </p:spTree>
-    <p:extLst>
-      <p:ext uri="{BB962C8B-B14F-4D97-AF65-F5344CB8AC3E}">
-        <p14:creationId xmlns:p14="http://schemas.microsoft.com/office/powerpoint/2010/main" val="1395298112"/>
-      </p:ext>
-    </p:extLst>
-  </p:cSld>
-  <p:clrMapOvr>
-    <a:masterClrMapping/>
-  </p:clrMapOvr>
-</p:sld>
-</file>
-
 <file path=ppt/slides/slide23.xml><?xml version="1.0" encoding="utf-8"?>
 <p:sld xmlns:a="http://schemas.openxmlformats.org/drawingml/2006/main" xmlns:r="http://schemas.openxmlformats.org/officeDocument/2006/relationships" xmlns:p="http://schemas.openxmlformats.org/presentationml/2006/main">
   <p:cSld>
@@ -14632,12 +15052,16 @@
               <a:t>	   </a:t>
             </a:r>
             <a:r>
+              <a:rPr lang="en-US" sz="3600" dirty="0"/>
+              <a:t>docker image build –t </a:t>
+            </a:r>
+            <a:r>
               <a:rPr lang="en-US" sz="3600" dirty="0" err="1"/>
-              <a:t>dockerize</a:t>
+              <a:t>customnginx</a:t>
             </a:r>
             <a:r>
               <a:rPr lang="en-US" sz="3600" dirty="0"/>
-              <a:t> a node.js application</a:t>
+              <a:t> .</a:t>
             </a:r>
           </a:p>
         </p:txBody>
@@ -14645,7 +15069,7 @@
     </p:spTree>
     <p:extLst>
       <p:ext uri="{BB962C8B-B14F-4D97-AF65-F5344CB8AC3E}">
-        <p14:creationId xmlns:p14="http://schemas.microsoft.com/office/powerpoint/2010/main" val="209460995"/>
+        <p14:creationId xmlns:p14="http://schemas.microsoft.com/office/powerpoint/2010/main" val="1395298112"/>
       </p:ext>
     </p:extLst>
   </p:cSld>
@@ -14689,7 +15113,7 @@
           <a:p>
             <a:r>
               <a:rPr lang="en-GB" dirty="0"/>
-              <a:t>Docker PERSISTENCE</a:t>
+              <a:t>DOCKERFILE: CREATING CUSTOM DOCKER IMAGES</a:t>
             </a:r>
             <a:endParaRPr lang="tr-TR" dirty="0"/>
           </a:p>
@@ -14713,12 +15137,17 @@
         </p:nvSpPr>
         <p:spPr/>
         <p:txBody>
-          <a:bodyPr/>
+          <a:bodyPr>
+            <a:normAutofit/>
+          </a:bodyPr>
           <a:lstStyle/>
           <a:p>
+            <a:pPr marL="0" indent="0">
+              <a:buNone/>
+            </a:pPr>
             <a:r>
               <a:rPr lang="en-US" dirty="0"/>
-              <a:t>Data Volumes</a:t>
+              <a:t>		</a:t>
             </a:r>
           </a:p>
           <a:p>
@@ -14726,12 +15155,9 @@
               <a:buNone/>
             </a:pPr>
             <a:r>
-              <a:rPr lang="en-US" dirty="0">
-                <a:hlinkClick r:id="rId2"/>
-              </a:rPr>
-              <a:t>https://github.com/docker-library/postgres/blob/master/10/Dockerfile</a:t>
-            </a:r>
-            <a:endParaRPr lang="en-US" dirty="0"/>
+              <a:rPr lang="en-US" dirty="0"/>
+              <a:t>		</a:t>
+            </a:r>
           </a:p>
           <a:p>
             <a:pPr marL="0" indent="0">
@@ -14739,58 +15165,23 @@
             </a:pPr>
             <a:r>
               <a:rPr lang="en-US" dirty="0"/>
-              <a:t>docker volume ls / rm / prune / inspect /create</a:t>
-            </a:r>
-          </a:p>
-          <a:p>
-            <a:pPr marL="0" indent="0">
-              <a:buNone/>
-            </a:pPr>
-            <a:r>
-              <a:rPr lang="en-US" dirty="0"/>
-              <a:t>docker image inspect </a:t>
-            </a:r>
-            <a:r>
-              <a:rPr lang="en-US" dirty="0" err="1"/>
-              <a:t>postgres</a:t>
-            </a:r>
-            <a:endParaRPr lang="en-US" dirty="0"/>
-          </a:p>
-          <a:p>
-            <a:pPr marL="0" indent="0">
-              <a:buNone/>
-            </a:pPr>
-            <a:r>
-              <a:rPr lang="en-US" dirty="0"/>
-              <a:t>docker container inspect </a:t>
-            </a:r>
-            <a:r>
-              <a:rPr lang="en-US" dirty="0" err="1"/>
-              <a:t>postgres</a:t>
-            </a:r>
-            <a:endParaRPr lang="en-US" dirty="0"/>
-          </a:p>
-          <a:p>
-            <a:pPr marL="0" indent="0">
-              <a:buNone/>
-            </a:pPr>
-            <a:r>
-              <a:rPr lang="en-US" dirty="0"/>
-              <a:t>docker volume inspect &lt;volume-id&gt;</a:t>
-            </a:r>
-          </a:p>
-          <a:p>
-            <a:pPr marL="0" indent="0">
-              <a:buNone/>
-            </a:pPr>
-            <a:endParaRPr lang="en-US" dirty="0"/>
+              <a:t>	   </a:t>
+            </a:r>
+            <a:r>
+              <a:rPr lang="en-US" sz="3600" dirty="0" err="1"/>
+              <a:t>dockerize</a:t>
+            </a:r>
+            <a:r>
+              <a:rPr lang="en-US" sz="3600" dirty="0"/>
+              <a:t> a node.js application</a:t>
+            </a:r>
           </a:p>
         </p:txBody>
       </p:sp>
     </p:spTree>
     <p:extLst>
       <p:ext uri="{BB962C8B-B14F-4D97-AF65-F5344CB8AC3E}">
-        <p14:creationId xmlns:p14="http://schemas.microsoft.com/office/powerpoint/2010/main" val="698232708"/>
+        <p14:creationId xmlns:p14="http://schemas.microsoft.com/office/powerpoint/2010/main" val="209460995"/>
       </p:ext>
     </p:extLst>
   </p:cSld>
@@ -14861,44 +15252,39 @@
           <a:bodyPr/>
           <a:lstStyle/>
           <a:p>
+            <a:r>
+              <a:rPr lang="en-US" dirty="0"/>
+              <a:t>Data Volumes</a:t>
+            </a:r>
+          </a:p>
+          <a:p>
             <a:pPr marL="0" indent="0">
               <a:buNone/>
             </a:pPr>
             <a:r>
+              <a:rPr lang="en-US" dirty="0">
+                <a:hlinkClick r:id="rId2"/>
+              </a:rPr>
+              <a:t>https://github.com/docker-library/postgres/blob/master/10/Dockerfile</a:t>
+            </a:r>
+            <a:endParaRPr lang="en-US" dirty="0"/>
+          </a:p>
+          <a:p>
+            <a:pPr marL="0" indent="0">
+              <a:buNone/>
+            </a:pPr>
+            <a:r>
               <a:rPr lang="en-US" dirty="0"/>
-              <a:t>docker container  run -d --name </a:t>
-            </a:r>
-            <a:r>
-              <a:rPr lang="en-US" dirty="0" err="1"/>
-              <a:t>db</a:t>
-            </a:r>
+              <a:t>docker volume ls / rm / prune / inspect /create</a:t>
+            </a:r>
+          </a:p>
+          <a:p>
+            <a:pPr marL="0" indent="0">
+              <a:buNone/>
+            </a:pPr>
             <a:r>
               <a:rPr lang="en-US" dirty="0"/>
-              <a:t> -e POSTGRES_PASSWORD=</a:t>
-            </a:r>
-            <a:r>
-              <a:rPr lang="en-US" dirty="0" err="1"/>
-              <a:t>mysecretpw</a:t>
-            </a:r>
-            <a:r>
-              <a:rPr lang="en-US" dirty="0"/>
-              <a:t> -v </a:t>
-            </a:r>
-            <a:r>
-              <a:rPr lang="en-US" dirty="0" err="1"/>
-              <a:t>postgres-db</a:t>
-            </a:r>
-            <a:r>
-              <a:rPr lang="en-US" dirty="0"/>
-              <a:t>:/var/lib/</a:t>
-            </a:r>
-            <a:r>
-              <a:rPr lang="en-US" dirty="0" err="1"/>
-              <a:t>postgresql</a:t>
-            </a:r>
-            <a:r>
-              <a:rPr lang="en-US" dirty="0"/>
-              <a:t>/data </a:t>
+              <a:t>docker image inspect </a:t>
             </a:r>
             <a:r>
               <a:rPr lang="en-US" dirty="0" err="1"/>
@@ -14912,8 +15298,13 @@
             </a:pPr>
             <a:r>
               <a:rPr lang="en-US" dirty="0"/>
-              <a:t>you may delete the container and mount the same volume again to another container</a:t>
-            </a:r>
+              <a:t>docker container inspect </a:t>
+            </a:r>
+            <a:r>
+              <a:rPr lang="en-US" dirty="0" err="1"/>
+              <a:t>postgres</a:t>
+            </a:r>
+            <a:endParaRPr lang="en-US" dirty="0"/>
           </a:p>
           <a:p>
             <a:pPr marL="0" indent="0">
@@ -14921,15 +15312,21 @@
             </a:pPr>
             <a:r>
               <a:rPr lang="en-US" dirty="0"/>
-              <a:t>docker volume create --help</a:t>
-            </a:r>
+              <a:t>docker volume inspect &lt;volume-id&gt;</a:t>
+            </a:r>
+          </a:p>
+          <a:p>
+            <a:pPr marL="0" indent="0">
+              <a:buNone/>
+            </a:pPr>
+            <a:endParaRPr lang="en-US" dirty="0"/>
           </a:p>
         </p:txBody>
       </p:sp>
     </p:spTree>
     <p:extLst>
       <p:ext uri="{BB962C8B-B14F-4D97-AF65-F5344CB8AC3E}">
-        <p14:creationId xmlns:p14="http://schemas.microsoft.com/office/powerpoint/2010/main" val="1905426026"/>
+        <p14:creationId xmlns:p14="http://schemas.microsoft.com/office/powerpoint/2010/main" val="698232708"/>
       </p:ext>
     </p:extLst>
   </p:cSld>
@@ -15000,10 +15397,50 @@
           <a:bodyPr/>
           <a:lstStyle/>
           <a:p>
+            <a:pPr marL="0" indent="0">
+              <a:buNone/>
+            </a:pPr>
             <a:r>
               <a:rPr lang="en-US" dirty="0"/>
-              <a:t>Bind Mounts</a:t>
-            </a:r>
+              <a:t>docker container  run -d --name </a:t>
+            </a:r>
+            <a:r>
+              <a:rPr lang="en-US" dirty="0" err="1"/>
+              <a:t>db</a:t>
+            </a:r>
+            <a:r>
+              <a:rPr lang="en-US" dirty="0"/>
+              <a:t> -e POSTGRES_PASSWORD=</a:t>
+            </a:r>
+            <a:r>
+              <a:rPr lang="en-US" dirty="0" err="1"/>
+              <a:t>mysecretpw</a:t>
+            </a:r>
+            <a:r>
+              <a:rPr lang="en-US" dirty="0"/>
+              <a:t> -v </a:t>
+            </a:r>
+            <a:r>
+              <a:rPr lang="en-US" dirty="0" err="1"/>
+              <a:t>postgres-db</a:t>
+            </a:r>
+            <a:r>
+              <a:rPr lang="en-US" dirty="0"/>
+              <a:t>:/var/lib/</a:t>
+            </a:r>
+            <a:r>
+              <a:rPr lang="en-US" dirty="0" err="1"/>
+              <a:t>postgresql</a:t>
+            </a:r>
+            <a:r>
+              <a:rPr lang="en-US" dirty="0"/>
+              <a:t>/data </a:t>
+            </a:r>
+            <a:r>
+              <a:rPr lang="en-US" dirty="0" err="1"/>
+              <a:t>postgres</a:t>
+            </a:r>
+            <a:endParaRPr lang="en-US" dirty="0"/>
           </a:p>
           <a:p>
             <a:pPr marL="0" indent="0">
@@ -15011,52 +15448,24 @@
             </a:pPr>
             <a:r>
               <a:rPr lang="en-US" dirty="0"/>
-              <a:t>... run -v /Users/user1/stuff:/path/container (mac/</a:t>
-            </a:r>
-            <a:r>
-              <a:rPr lang="en-US" dirty="0" err="1"/>
-              <a:t>linux</a:t>
-            </a:r>
+              <a:t>you may delete the container and mount the same volume again to another container</a:t>
+            </a:r>
+          </a:p>
+          <a:p>
+            <a:pPr marL="0" indent="0">
+              <a:buNone/>
+            </a:pPr>
             <a:r>
               <a:rPr lang="en-US" dirty="0"/>
-              <a:t>)</a:t>
-            </a:r>
-          </a:p>
-          <a:p>
-            <a:pPr marL="0" indent="0">
-              <a:buNone/>
-            </a:pPr>
-            <a:r>
-              <a:rPr lang="en-US" dirty="0"/>
-              <a:t>... run -v //c/Users/user1/stuff:/path/container (windows)</a:t>
-            </a:r>
-          </a:p>
-          <a:p>
-            <a:pPr marL="0" indent="0">
-              <a:buNone/>
-            </a:pPr>
-            <a:r>
-              <a:rPr lang="en-US" dirty="0"/>
-              <a:t>docker run -d --name proxy1 -v C:\Users\Serdar\Desktop\dockerEgitim\bindmount:/usr/share/nginx/html -p 8080:80  </a:t>
-            </a:r>
-            <a:r>
-              <a:rPr lang="en-US" dirty="0" err="1"/>
-              <a:t>nginx</a:t>
-            </a:r>
-            <a:endParaRPr lang="en-US" dirty="0"/>
-          </a:p>
-          <a:p>
-            <a:pPr marL="0" indent="0">
-              <a:buNone/>
-            </a:pPr>
-            <a:endParaRPr lang="en-US" dirty="0"/>
+              <a:t>docker volume create --help</a:t>
+            </a:r>
           </a:p>
         </p:txBody>
       </p:sp>
     </p:spTree>
     <p:extLst>
       <p:ext uri="{BB962C8B-B14F-4D97-AF65-F5344CB8AC3E}">
-        <p14:creationId xmlns:p14="http://schemas.microsoft.com/office/powerpoint/2010/main" val="2398701180"/>
+        <p14:creationId xmlns:p14="http://schemas.microsoft.com/office/powerpoint/2010/main" val="1905426026"/>
       </p:ext>
     </p:extLst>
   </p:cSld>
@@ -15100,7 +15509,7 @@
           <a:p>
             <a:r>
               <a:rPr lang="en-GB" dirty="0"/>
-              <a:t>DOCKER COMPOSE</a:t>
+              <a:t>Docker PERSISTENCE</a:t>
             </a:r>
             <a:endParaRPr lang="tr-TR" dirty="0"/>
           </a:p>
@@ -15129,26 +15538,61 @@
           <a:p>
             <a:r>
               <a:rPr lang="en-US" dirty="0"/>
-              <a:t>docker-</a:t>
+              <a:t>Bind Mounts</a:t>
+            </a:r>
+          </a:p>
+          <a:p>
+            <a:pPr marL="0" indent="0">
+              <a:buNone/>
+            </a:pPr>
+            <a:r>
+              <a:rPr lang="en-US" dirty="0"/>
+              <a:t>... run -v /Users/user1/stuff:/path/container (mac/</a:t>
             </a:r>
             <a:r>
               <a:rPr lang="en-US" dirty="0" err="1"/>
-              <a:t>compose.yml</a:t>
+              <a:t>linux</a:t>
+            </a:r>
+            <a:r>
+              <a:rPr lang="en-US" dirty="0"/>
+              <a:t>)</a:t>
+            </a:r>
+          </a:p>
+          <a:p>
+            <a:pPr marL="0" indent="0">
+              <a:buNone/>
+            </a:pPr>
+            <a:r>
+              <a:rPr lang="en-US" dirty="0"/>
+              <a:t>... run -v //c/Users/user1/stuff:/path/container (windows)</a:t>
+            </a:r>
+          </a:p>
+          <a:p>
+            <a:pPr marL="0" indent="0">
+              <a:buNone/>
+            </a:pPr>
+            <a:r>
+              <a:rPr lang="en-US" dirty="0"/>
+              <a:t>docker run -d --name proxy1 -v C:\Users\Serdar\Desktop\dockerEgitim\bindmount:/usr/share/nginx/html -p 8080:80  </a:t>
+            </a:r>
+            <a:r>
+              <a:rPr lang="en-US" dirty="0" err="1"/>
+              <a:t>nginx</a:t>
             </a:r>
             <a:endParaRPr lang="en-US" dirty="0"/>
           </a:p>
           <a:p>
-            <a:r>
-              <a:rPr lang="en-US" dirty="0"/>
-              <a:t>docker-compose CLI</a:t>
-            </a:r>
+            <a:pPr marL="0" indent="0">
+              <a:buNone/>
+            </a:pPr>
+            <a:endParaRPr lang="en-US" dirty="0"/>
           </a:p>
         </p:txBody>
       </p:sp>
     </p:spTree>
     <p:extLst>
       <p:ext uri="{BB962C8B-B14F-4D97-AF65-F5344CB8AC3E}">
-        <p14:creationId xmlns:p14="http://schemas.microsoft.com/office/powerpoint/2010/main" val="484121309"/>
+        <p14:creationId xmlns:p14="http://schemas.microsoft.com/office/powerpoint/2010/main" val="2398701180"/>
       </p:ext>
     </p:extLst>
   </p:cSld>
@@ -15220,36 +15664,57 @@
           <a:lstStyle/>
           <a:p>
             <a:r>
-              <a:rPr lang="en-GB" dirty="0"/>
-              <a:t>Creating </a:t>
-            </a:r>
-            <a:r>
-              <a:rPr lang="en-GB" dirty="0" err="1"/>
-              <a:t>elasticsearch</a:t>
-            </a:r>
-            <a:r>
-              <a:rPr lang="en-GB" dirty="0"/>
-              <a:t> and </a:t>
-            </a:r>
-            <a:r>
-              <a:rPr lang="en-GB" dirty="0" err="1"/>
-              <a:t>redis</a:t>
-            </a:r>
-            <a:r>
-              <a:rPr lang="en-GB" dirty="0"/>
-              <a:t> clusters locally with docker compose</a:t>
-            </a:r>
-            <a:endParaRPr lang="tr-TR" dirty="0"/>
-          </a:p>
-          <a:p>
+              <a:rPr lang="en-US" dirty="0"/>
+              <a:t>docker-</a:t>
+            </a:r>
+            <a:r>
+              <a:rPr lang="en-US" dirty="0" err="1"/>
+              <a:t>compose.yml</a:t>
+            </a:r>
             <a:endParaRPr lang="en-US" dirty="0"/>
+          </a:p>
+          <a:p>
+            <a:r>
+              <a:rPr lang="en-US" dirty="0"/>
+              <a:t>docker-compose CLI</a:t>
+            </a:r>
           </a:p>
         </p:txBody>
       </p:sp>
+      <p:pic>
+        <p:nvPicPr>
+          <p:cNvPr id="3" name="Picture 2"/>
+          <p:cNvPicPr>
+            <a:picLocks noChangeAspect="1"/>
+          </p:cNvPicPr>
+          <p:nvPr/>
+        </p:nvPicPr>
+        <p:blipFill>
+          <a:blip r:embed="rId2">
+            <a:extLst>
+              <a:ext uri="{28A0092B-C50C-407E-A947-70E740481C1C}">
+                <a14:useLocalDpi xmlns:a14="http://schemas.microsoft.com/office/drawing/2010/main" val="0"/>
+              </a:ext>
+            </a:extLst>
+          </a:blip>
+          <a:stretch>
+            <a:fillRect/>
+          </a:stretch>
+        </p:blipFill>
+        <p:spPr>
+          <a:xfrm>
+            <a:off x="8092526" y="1979301"/>
+            <a:ext cx="2315008" cy="4082085"/>
+          </a:xfrm>
+          <a:prstGeom prst="rect">
+            <a:avLst/>
+          </a:prstGeom>
+        </p:spPr>
+      </p:pic>
     </p:spTree>
     <p:extLst>
       <p:ext uri="{BB962C8B-B14F-4D97-AF65-F5344CB8AC3E}">
-        <p14:creationId xmlns:p14="http://schemas.microsoft.com/office/powerpoint/2010/main" val="1493332376"/>
+        <p14:creationId xmlns:p14="http://schemas.microsoft.com/office/powerpoint/2010/main" val="484121309"/>
       </p:ext>
     </p:extLst>
   </p:cSld>
@@ -15293,7 +15758,7 @@
           <a:p>
             <a:r>
               <a:rPr lang="en-GB" dirty="0"/>
-              <a:t>DOCKER CLOUD</a:t>
+              <a:t>DOCKER COMPOSE</a:t>
             </a:r>
             <a:endParaRPr lang="tr-TR" dirty="0"/>
           </a:p>
@@ -15322,11 +15787,11 @@
           <a:p>
             <a:r>
               <a:rPr lang="en-GB" dirty="0"/>
-              <a:t>Using </a:t>
+              <a:t>Creating </a:t>
             </a:r>
             <a:r>
               <a:rPr lang="en-GB" dirty="0" err="1"/>
-              <a:t>dockercloud</a:t>
+              <a:t>elasticsearch</a:t>
             </a:r>
             <a:r>
               <a:rPr lang="en-GB" dirty="0"/>
@@ -15334,15 +15799,12 @@
             </a:r>
             <a:r>
               <a:rPr lang="en-GB" dirty="0" err="1"/>
-              <a:t>dockerhub</a:t>
+              <a:t>redis</a:t>
             </a:r>
             <a:r>
               <a:rPr lang="en-GB" dirty="0"/>
-              <a:t> for continuous integration</a:t>
-            </a:r>
-            <a:endParaRPr lang="tr-TR" dirty="0"/>
-          </a:p>
-          <a:p>
+              <a:t> clusters locally with docker compose</a:t>
+            </a:r>
             <a:endParaRPr lang="tr-TR" dirty="0"/>
           </a:p>
           <a:p>
@@ -15350,10 +15812,70 @@
           </a:p>
         </p:txBody>
       </p:sp>
+      <p:pic>
+        <p:nvPicPr>
+          <p:cNvPr id="3" name="Picture 2"/>
+          <p:cNvPicPr>
+            <a:picLocks noChangeAspect="1"/>
+          </p:cNvPicPr>
+          <p:nvPr/>
+        </p:nvPicPr>
+        <p:blipFill>
+          <a:blip r:embed="rId2">
+            <a:extLst>
+              <a:ext uri="{28A0092B-C50C-407E-A947-70E740481C1C}">
+                <a14:useLocalDpi xmlns:a14="http://schemas.microsoft.com/office/drawing/2010/main" val="0"/>
+              </a:ext>
+            </a:extLst>
+          </a:blip>
+          <a:stretch>
+            <a:fillRect/>
+          </a:stretch>
+        </p:blipFill>
+        <p:spPr>
+          <a:xfrm>
+            <a:off x="7498246" y="3494627"/>
+            <a:ext cx="2565532" cy="2448973"/>
+          </a:xfrm>
+          <a:prstGeom prst="rect">
+            <a:avLst/>
+          </a:prstGeom>
+        </p:spPr>
+      </p:pic>
+      <p:pic>
+        <p:nvPicPr>
+          <p:cNvPr id="4" name="Picture 3"/>
+          <p:cNvPicPr>
+            <a:picLocks noChangeAspect="1"/>
+          </p:cNvPicPr>
+          <p:nvPr/>
+        </p:nvPicPr>
+        <p:blipFill>
+          <a:blip r:embed="rId3">
+            <a:extLst>
+              <a:ext uri="{28A0092B-C50C-407E-A947-70E740481C1C}">
+                <a14:useLocalDpi xmlns:a14="http://schemas.microsoft.com/office/drawing/2010/main" val="0"/>
+              </a:ext>
+            </a:extLst>
+          </a:blip>
+          <a:stretch>
+            <a:fillRect/>
+          </a:stretch>
+        </p:blipFill>
+        <p:spPr>
+          <a:xfrm>
+            <a:off x="1726104" y="3494627"/>
+            <a:ext cx="4566632" cy="2455178"/>
+          </a:xfrm>
+          <a:prstGeom prst="rect">
+            <a:avLst/>
+          </a:prstGeom>
+        </p:spPr>
+      </p:pic>
     </p:spTree>
     <p:extLst>
       <p:ext uri="{BB962C8B-B14F-4D97-AF65-F5344CB8AC3E}">
-        <p14:creationId xmlns:p14="http://schemas.microsoft.com/office/powerpoint/2010/main" val="3930937194"/>
+        <p14:creationId xmlns:p14="http://schemas.microsoft.com/office/powerpoint/2010/main" val="1493332376"/>
       </p:ext>
     </p:extLst>
   </p:cSld>
@@ -15450,15 +15972,21 @@
         </p:spPr>
         <p:txBody>
           <a:bodyPr>
-            <a:normAutofit/>
+            <a:normAutofit fontScale="92500" lnSpcReduction="10000"/>
           </a:bodyPr>
           <a:lstStyle/>
           <a:p>
             <a:r>
-              <a:rPr lang="en-US"/>
+              <a:rPr lang="en-US" dirty="0"/>
+              <a:t>Custom Docker Images</a:t>
+            </a:r>
+            <a:endParaRPr lang="tr-TR" dirty="0"/>
+          </a:p>
+          <a:p>
+            <a:r>
+              <a:rPr lang="en-US" dirty="0"/>
               <a:t>Docker-Compose</a:t>
             </a:r>
-            <a:endParaRPr lang="en-US" dirty="0"/>
           </a:p>
           <a:p>
             <a:r>
@@ -15471,6 +15999,20 @@
               <a:rPr lang="en-US" dirty="0"/>
               <a:t>Node.js</a:t>
             </a:r>
+            <a:endParaRPr lang="tr-TR" dirty="0"/>
+          </a:p>
+          <a:p>
+            <a:r>
+              <a:rPr lang="tr-TR" dirty="0"/>
+              <a:t>Docker Machine</a:t>
+            </a:r>
+          </a:p>
+          <a:p>
+            <a:r>
+              <a:rPr lang="tr-TR" dirty="0"/>
+              <a:t>Docker Swarm</a:t>
+            </a:r>
+            <a:endParaRPr lang="en-US" dirty="0"/>
           </a:p>
           <a:p>
             <a:r>
@@ -15480,39 +16022,9 @@
           </a:p>
           <a:p>
             <a:r>
-              <a:rPr lang="en-US" dirty="0"/>
-              <a:t>Using </a:t>
-            </a:r>
-            <a:r>
-              <a:rPr lang="en-US" dirty="0" err="1"/>
-              <a:t>DockerCloud</a:t>
-            </a:r>
-            <a:endParaRPr lang="en-US" dirty="0"/>
-          </a:p>
-          <a:p>
-            <a:r>
-              <a:rPr lang="en-US" dirty="0" err="1"/>
-              <a:t>DockerCloud</a:t>
-            </a:r>
-            <a:r>
-              <a:rPr lang="en-US" dirty="0"/>
-              <a:t> &amp; </a:t>
-            </a:r>
-            <a:r>
-              <a:rPr lang="en-US" dirty="0" err="1"/>
-              <a:t>DockerHub</a:t>
-            </a:r>
-            <a:r>
-              <a:rPr lang="en-US" dirty="0"/>
-              <a:t> for CI</a:t>
-            </a:r>
-          </a:p>
-          <a:p>
-            <a:r>
-              <a:rPr lang="en-US" dirty="0"/>
-              <a:t>Amazon Elastic Container Registry</a:t>
-            </a:r>
-            <a:endParaRPr lang="tr-TR" dirty="0"/>
+              <a:rPr lang="tr-TR" dirty="0"/>
+              <a:t>Deployment to AWS</a:t>
+            </a:r>
           </a:p>
         </p:txBody>
       </p:sp>
@@ -15563,9 +16075,12 @@
           <a:p>
             <a:r>
               <a:rPr lang="en-GB" dirty="0"/>
-              <a:t>DOCKER DEPLOYMENT</a:t>
-            </a:r>
-            <a:endParaRPr lang="tr-TR" dirty="0"/>
+              <a:t>DOCKER </a:t>
+            </a:r>
+            <a:r>
+              <a:rPr lang="tr-TR" dirty="0"/>
+              <a:t>MaCHİNE</a:t>
+            </a:r>
           </a:p>
         </p:txBody>
       </p:sp>
@@ -15585,6 +16100,116 @@
             <p:ph idx="1"/>
           </p:nvPr>
         </p:nvSpPr>
+        <p:spPr>
+          <a:xfrm>
+            <a:off x="1141413" y="2249487"/>
+            <a:ext cx="6431482" cy="3541714"/>
+          </a:xfrm>
+        </p:spPr>
+        <p:txBody>
+          <a:bodyPr/>
+          <a:lstStyle/>
+          <a:p>
+            <a:r>
+              <a:rPr lang="en-GB" dirty="0"/>
+              <a:t>Using </a:t>
+            </a:r>
+            <a:r>
+              <a:rPr lang="en-GB" dirty="0" err="1"/>
+              <a:t>dockercloud</a:t>
+            </a:r>
+            <a:r>
+              <a:rPr lang="en-GB" dirty="0"/>
+              <a:t> and </a:t>
+            </a:r>
+            <a:r>
+              <a:rPr lang="en-GB" dirty="0" err="1"/>
+              <a:t>dockerhub</a:t>
+            </a:r>
+            <a:r>
+              <a:rPr lang="en-GB" dirty="0"/>
+              <a:t> for continuous integration</a:t>
+            </a:r>
+            <a:endParaRPr lang="tr-TR" dirty="0"/>
+          </a:p>
+          <a:p>
+            <a:endParaRPr lang="tr-TR" dirty="0"/>
+          </a:p>
+          <a:p>
+            <a:endParaRPr lang="en-US" dirty="0"/>
+          </a:p>
+        </p:txBody>
+      </p:sp>
+      <p:pic>
+        <p:nvPicPr>
+          <p:cNvPr id="3" name="Picture 2"/>
+          <p:cNvPicPr>
+            <a:picLocks noChangeAspect="1"/>
+          </p:cNvPicPr>
+          <p:nvPr/>
+        </p:nvPicPr>
+        <p:blipFill>
+          <a:blip r:embed="rId2">
+            <a:extLst>
+              <a:ext uri="{28A0092B-C50C-407E-A947-70E740481C1C}">
+                <a14:useLocalDpi xmlns:a14="http://schemas.microsoft.com/office/drawing/2010/main" val="0"/>
+              </a:ext>
+            </a:extLst>
+          </a:blip>
+          <a:stretch>
+            <a:fillRect/>
+          </a:stretch>
+        </p:blipFill>
+        <p:spPr>
+          <a:xfrm>
+            <a:off x="7675417" y="1683326"/>
+            <a:ext cx="2954484" cy="3545380"/>
+          </a:xfrm>
+          <a:prstGeom prst="rect">
+            <a:avLst/>
+          </a:prstGeom>
+        </p:spPr>
+      </p:pic>
+    </p:spTree>
+    <p:extLst>
+      <p:ext uri="{BB962C8B-B14F-4D97-AF65-F5344CB8AC3E}">
+        <p14:creationId xmlns:p14="http://schemas.microsoft.com/office/powerpoint/2010/main" val="3930937194"/>
+      </p:ext>
+    </p:extLst>
+  </p:cSld>
+  <p:clrMapOvr>
+    <a:masterClrMapping/>
+  </p:clrMapOvr>
+</p:sld>
+</file>
+
+<file path=ppt/slides/slide31.xml><?xml version="1.0" encoding="utf-8"?>
+<p:sld xmlns:a="http://schemas.openxmlformats.org/drawingml/2006/main" xmlns:r="http://schemas.openxmlformats.org/officeDocument/2006/relationships" xmlns:p="http://schemas.openxmlformats.org/presentationml/2006/main">
+  <p:cSld>
+    <p:spTree>
+      <p:nvGrpSpPr>
+        <p:cNvPr id="1" name=""/>
+        <p:cNvGrpSpPr/>
+        <p:nvPr/>
+      </p:nvGrpSpPr>
+      <p:grpSpPr>
+        <a:xfrm>
+          <a:off x="0" y="0"/>
+          <a:ext cx="0" cy="0"/>
+          <a:chOff x="0" y="0"/>
+          <a:chExt cx="0" cy="0"/>
+        </a:xfrm>
+      </p:grpSpPr>
+      <p:sp>
+        <p:nvSpPr>
+          <p:cNvPr id="2" name="Title 1"/>
+          <p:cNvSpPr>
+            <a:spLocks noGrp="1"/>
+          </p:cNvSpPr>
+          <p:nvPr>
+            <p:ph type="title"/>
+          </p:nvPr>
+        </p:nvSpPr>
         <p:spPr/>
         <p:txBody>
           <a:bodyPr/>
@@ -15592,6 +16217,177 @@
           <a:p>
             <a:r>
               <a:rPr lang="en-GB" dirty="0"/>
+              <a:t>DOCKER </a:t>
+            </a:r>
+            <a:r>
+              <a:rPr lang="tr-TR" dirty="0"/>
+              <a:t>SWARM MODE</a:t>
+            </a:r>
+          </a:p>
+        </p:txBody>
+      </p:sp>
+      <p:sp>
+        <p:nvSpPr>
+          <p:cNvPr id="5" name="Content Placeholder 4">
+            <a:extLst>
+              <a:ext uri="{FF2B5EF4-FFF2-40B4-BE49-F238E27FC236}">
+                <a16:creationId xmlns:a16="http://schemas.microsoft.com/office/drawing/2014/main" id="{16E0D661-67E9-4EBB-8D27-4881FDB37593}"/>
+              </a:ext>
+            </a:extLst>
+          </p:cNvPr>
+          <p:cNvSpPr>
+            <a:spLocks noGrp="1"/>
+          </p:cNvSpPr>
+          <p:nvPr>
+            <p:ph idx="1"/>
+          </p:nvPr>
+        </p:nvSpPr>
+        <p:spPr>
+          <a:xfrm>
+            <a:off x="1141413" y="2249487"/>
+            <a:ext cx="6431482" cy="3541714"/>
+          </a:xfrm>
+        </p:spPr>
+        <p:txBody>
+          <a:bodyPr/>
+          <a:lstStyle/>
+          <a:p>
+            <a:r>
+              <a:rPr lang="en-GB" dirty="0"/>
+              <a:t>Using </a:t>
+            </a:r>
+            <a:r>
+              <a:rPr lang="en-GB" dirty="0" err="1"/>
+              <a:t>dockercloud</a:t>
+            </a:r>
+            <a:r>
+              <a:rPr lang="en-GB" dirty="0"/>
+              <a:t> and </a:t>
+            </a:r>
+            <a:r>
+              <a:rPr lang="en-GB" dirty="0" err="1"/>
+              <a:t>dockerhub</a:t>
+            </a:r>
+            <a:r>
+              <a:rPr lang="en-GB" dirty="0"/>
+              <a:t> for continuous integration</a:t>
+            </a:r>
+            <a:endParaRPr lang="tr-TR" dirty="0"/>
+          </a:p>
+          <a:p>
+            <a:endParaRPr lang="tr-TR" dirty="0"/>
+          </a:p>
+          <a:p>
+            <a:endParaRPr lang="en-US" dirty="0"/>
+          </a:p>
+        </p:txBody>
+      </p:sp>
+      <p:pic>
+        <p:nvPicPr>
+          <p:cNvPr id="4" name="Picture 3"/>
+          <p:cNvPicPr>
+            <a:picLocks noChangeAspect="1"/>
+          </p:cNvPicPr>
+          <p:nvPr/>
+        </p:nvPicPr>
+        <p:blipFill>
+          <a:blip r:embed="rId2">
+            <a:extLst>
+              <a:ext uri="{28A0092B-C50C-407E-A947-70E740481C1C}">
+                <a14:useLocalDpi xmlns:a14="http://schemas.microsoft.com/office/drawing/2010/main" val="0"/>
+              </a:ext>
+            </a:extLst>
+          </a:blip>
+          <a:stretch>
+            <a:fillRect/>
+          </a:stretch>
+        </p:blipFill>
+        <p:spPr>
+          <a:xfrm>
+            <a:off x="8078932" y="2173544"/>
+            <a:ext cx="2644486" cy="3617657"/>
+          </a:xfrm>
+          <a:prstGeom prst="rect">
+            <a:avLst/>
+          </a:prstGeom>
+        </p:spPr>
+      </p:pic>
+    </p:spTree>
+    <p:extLst>
+      <p:ext uri="{BB962C8B-B14F-4D97-AF65-F5344CB8AC3E}">
+        <p14:creationId xmlns:p14="http://schemas.microsoft.com/office/powerpoint/2010/main" val="3109281360"/>
+      </p:ext>
+    </p:extLst>
+  </p:cSld>
+  <p:clrMapOvr>
+    <a:masterClrMapping/>
+  </p:clrMapOvr>
+</p:sld>
+</file>
+
+<file path=ppt/slides/slide32.xml><?xml version="1.0" encoding="utf-8"?>
+<p:sld xmlns:a="http://schemas.openxmlformats.org/drawingml/2006/main" xmlns:r="http://schemas.openxmlformats.org/officeDocument/2006/relationships" xmlns:p="http://schemas.openxmlformats.org/presentationml/2006/main">
+  <p:cSld>
+    <p:spTree>
+      <p:nvGrpSpPr>
+        <p:cNvPr id="1" name=""/>
+        <p:cNvGrpSpPr/>
+        <p:nvPr/>
+      </p:nvGrpSpPr>
+      <p:grpSpPr>
+        <a:xfrm>
+          <a:off x="0" y="0"/>
+          <a:ext cx="0" cy="0"/>
+          <a:chOff x="0" y="0"/>
+          <a:chExt cx="0" cy="0"/>
+        </a:xfrm>
+      </p:grpSpPr>
+      <p:sp>
+        <p:nvSpPr>
+          <p:cNvPr id="2" name="Title 1"/>
+          <p:cNvSpPr>
+            <a:spLocks noGrp="1"/>
+          </p:cNvSpPr>
+          <p:nvPr>
+            <p:ph type="title"/>
+          </p:nvPr>
+        </p:nvSpPr>
+        <p:spPr/>
+        <p:txBody>
+          <a:bodyPr/>
+          <a:lstStyle/>
+          <a:p>
+            <a:r>
+              <a:rPr lang="en-GB" dirty="0"/>
+              <a:t>DOCKER DEPLOYMENT</a:t>
+            </a:r>
+            <a:endParaRPr lang="tr-TR" dirty="0"/>
+          </a:p>
+        </p:txBody>
+      </p:sp>
+      <p:sp>
+        <p:nvSpPr>
+          <p:cNvPr id="5" name="Content Placeholder 4">
+            <a:extLst>
+              <a:ext uri="{FF2B5EF4-FFF2-40B4-BE49-F238E27FC236}">
+                <a16:creationId xmlns:a16="http://schemas.microsoft.com/office/drawing/2014/main" id="{16E0D661-67E9-4EBB-8D27-4881FDB37593}"/>
+              </a:ext>
+            </a:extLst>
+          </p:cNvPr>
+          <p:cNvSpPr>
+            <a:spLocks noGrp="1"/>
+          </p:cNvSpPr>
+          <p:nvPr>
+            <p:ph idx="1"/>
+          </p:nvPr>
+        </p:nvSpPr>
+        <p:spPr/>
+        <p:txBody>
+          <a:bodyPr/>
+          <a:lstStyle/>
+          <a:p>
+            <a:r>
+              <a:rPr lang="en-GB" dirty="0"/>
               <a:t>Digital Ocean Deployment</a:t>
             </a:r>
           </a:p>
@@ -15604,6 +16400,66 @@
           </a:p>
         </p:txBody>
       </p:sp>
+      <p:pic>
+        <p:nvPicPr>
+          <p:cNvPr id="3" name="Picture 2"/>
+          <p:cNvPicPr>
+            <a:picLocks noChangeAspect="1"/>
+          </p:cNvPicPr>
+          <p:nvPr/>
+        </p:nvPicPr>
+        <p:blipFill>
+          <a:blip r:embed="rId2">
+            <a:extLst>
+              <a:ext uri="{28A0092B-C50C-407E-A947-70E740481C1C}">
+                <a14:useLocalDpi xmlns:a14="http://schemas.microsoft.com/office/drawing/2010/main" val="0"/>
+              </a:ext>
+            </a:extLst>
+          </a:blip>
+          <a:stretch>
+            <a:fillRect/>
+          </a:stretch>
+        </p:blipFill>
+        <p:spPr>
+          <a:xfrm>
+            <a:off x="1141412" y="3647295"/>
+            <a:ext cx="4375005" cy="2296305"/>
+          </a:xfrm>
+          <a:prstGeom prst="rect">
+            <a:avLst/>
+          </a:prstGeom>
+        </p:spPr>
+      </p:pic>
+      <p:pic>
+        <p:nvPicPr>
+          <p:cNvPr id="4" name="Picture 3"/>
+          <p:cNvPicPr>
+            <a:picLocks noChangeAspect="1"/>
+          </p:cNvPicPr>
+          <p:nvPr/>
+        </p:nvPicPr>
+        <p:blipFill>
+          <a:blip r:embed="rId3">
+            <a:extLst>
+              <a:ext uri="{28A0092B-C50C-407E-A947-70E740481C1C}">
+                <a14:useLocalDpi xmlns:a14="http://schemas.microsoft.com/office/drawing/2010/main" val="0"/>
+              </a:ext>
+            </a:extLst>
+          </a:blip>
+          <a:stretch>
+            <a:fillRect/>
+          </a:stretch>
+        </p:blipFill>
+        <p:spPr>
+          <a:xfrm>
+            <a:off x="6301493" y="3647295"/>
+            <a:ext cx="4592609" cy="2296305"/>
+          </a:xfrm>
+          <a:prstGeom prst="rect">
+            <a:avLst/>
+          </a:prstGeom>
+        </p:spPr>
+      </p:pic>
     </p:spTree>
     <p:extLst>
       <p:ext uri="{BB962C8B-B14F-4D97-AF65-F5344CB8AC3E}">
@@ -15617,7 +16473,7 @@
 </p:sld>
 </file>
 
-<file path=ppt/slides/slide31.xml><?xml version="1.0" encoding="utf-8"?>
+<file path=ppt/slides/slide33.xml><?xml version="1.0" encoding="utf-8"?>
 <p:sld xmlns:a="http://schemas.openxmlformats.org/drawingml/2006/main" xmlns:r="http://schemas.openxmlformats.org/officeDocument/2006/relationships" xmlns:p="http://schemas.openxmlformats.org/presentationml/2006/main">
   <p:cSld>
     <p:spTree>
@@ -15884,10 +16740,9 @@
               <a:t>docker</a:t>
             </a:r>
             <a:r>
-              <a:rPr lang="en-GB" dirty="0"/>
+              <a:rPr lang="tr-TR" dirty="0"/>
               <a:t>?</a:t>
             </a:r>
-            <a:endParaRPr lang="tr-TR" dirty="0"/>
           </a:p>
         </p:txBody>
       </p:sp>
@@ -15967,6 +16822,12 @@
             <a:r>
               <a:rPr lang="en-US" dirty="0"/>
               <a:t>Moves very fast</a:t>
+            </a:r>
+          </a:p>
+          <a:p>
+            <a:r>
+              <a:rPr lang="en-US" dirty="0"/>
+              <a:t>Lightweight</a:t>
             </a:r>
             <a:endParaRPr lang="tr-TR" dirty="0"/>
           </a:p>
@@ -16018,6 +16879,176 @@
           <a:lstStyle/>
           <a:p>
             <a:r>
+              <a:rPr lang="tr-TR" dirty="0"/>
+              <a:t>DOCKER BENEFITS</a:t>
+            </a:r>
+          </a:p>
+        </p:txBody>
+      </p:sp>
+      <p:pic>
+        <p:nvPicPr>
+          <p:cNvPr id="9" name="Content Placeholder 8"/>
+          <p:cNvPicPr>
+            <a:picLocks noGrp="1" noChangeAspect="1"/>
+          </p:cNvPicPr>
+          <p:nvPr>
+            <p:ph sz="half" idx="1"/>
+          </p:nvPr>
+        </p:nvPicPr>
+        <p:blipFill>
+          <a:blip r:embed="rId2">
+            <a:extLst>
+              <a:ext uri="{28A0092B-C50C-407E-A947-70E740481C1C}">
+                <a14:useLocalDpi xmlns:a14="http://schemas.microsoft.com/office/drawing/2010/main" val="0"/>
+              </a:ext>
+            </a:extLst>
+          </a:blip>
+          <a:stretch>
+            <a:fillRect/>
+          </a:stretch>
+        </p:blipFill>
+        <p:spPr>
+          <a:xfrm>
+            <a:off x="1593671" y="2249488"/>
+            <a:ext cx="3973870" cy="3541712"/>
+          </a:xfrm>
+        </p:spPr>
+      </p:pic>
+      <p:sp>
+        <p:nvSpPr>
+          <p:cNvPr id="4" name="Content Placeholder 3"/>
+          <p:cNvSpPr>
+            <a:spLocks noGrp="1"/>
+          </p:cNvSpPr>
+          <p:nvPr>
+            <p:ph sz="half" idx="2"/>
+          </p:nvPr>
+        </p:nvSpPr>
+        <p:spPr>
+          <a:xfrm>
+            <a:off x="6172200" y="1546412"/>
+            <a:ext cx="4875211" cy="4244788"/>
+          </a:xfrm>
+        </p:spPr>
+        <p:txBody>
+          <a:bodyPr>
+            <a:normAutofit fontScale="92500" lnSpcReduction="20000"/>
+          </a:bodyPr>
+          <a:lstStyle/>
+          <a:p>
+            <a:r>
+              <a:rPr lang="tr-TR" dirty="0"/>
+              <a:t>Immutable Infrastructure</a:t>
+            </a:r>
+          </a:p>
+          <a:p>
+            <a:r>
+              <a:rPr lang="tr-TR" dirty="0"/>
+              <a:t>Portability</a:t>
+            </a:r>
+          </a:p>
+          <a:p>
+            <a:r>
+              <a:rPr lang="en-US" dirty="0" err="1"/>
+              <a:t>Ea</a:t>
+            </a:r>
+            <a:r>
+              <a:rPr lang="tr-TR" dirty="0"/>
+              <a:t>sy Developer Onboarding</a:t>
+            </a:r>
+            <a:endParaRPr lang="en-US" dirty="0"/>
+          </a:p>
+          <a:p>
+            <a:r>
+              <a:rPr lang="tr-TR" dirty="0"/>
+              <a:t>Learning new technologies</a:t>
+            </a:r>
+            <a:endParaRPr lang="en-US" dirty="0"/>
+          </a:p>
+          <a:p>
+            <a:r>
+              <a:rPr lang="tr-TR" dirty="0"/>
+              <a:t>Dev-Prod Parity</a:t>
+            </a:r>
+          </a:p>
+          <a:p>
+            <a:r>
+              <a:rPr lang="tr-TR" dirty="0"/>
+              <a:t>Infrastructure Utilization </a:t>
+            </a:r>
+          </a:p>
+          <a:p>
+            <a:r>
+              <a:rPr lang="tr-TR" dirty="0"/>
+              <a:t>Fast and Easy Deployments</a:t>
+            </a:r>
+          </a:p>
+          <a:p>
+            <a:r>
+              <a:rPr lang="tr-TR" dirty="0"/>
+              <a:t>Microservices Support</a:t>
+            </a:r>
+          </a:p>
+          <a:p>
+            <a:r>
+              <a:rPr lang="tr-TR" dirty="0"/>
+              <a:t>Support for Cont. Int/Del.</a:t>
+            </a:r>
+          </a:p>
+          <a:p>
+            <a:endParaRPr lang="tr-TR" dirty="0"/>
+          </a:p>
+          <a:p>
+            <a:endParaRPr lang="en-US" dirty="0"/>
+          </a:p>
+        </p:txBody>
+      </p:sp>
+    </p:spTree>
+    <p:extLst>
+      <p:ext uri="{BB962C8B-B14F-4D97-AF65-F5344CB8AC3E}">
+        <p14:creationId xmlns:p14="http://schemas.microsoft.com/office/powerpoint/2010/main" val="3054464652"/>
+      </p:ext>
+    </p:extLst>
+  </p:cSld>
+  <p:clrMapOvr>
+    <a:masterClrMapping/>
+  </p:clrMapOvr>
+</p:sld>
+</file>
+
+<file path=ppt/slides/slide7.xml><?xml version="1.0" encoding="utf-8"?>
+<p:sld xmlns:a="http://schemas.openxmlformats.org/drawingml/2006/main" xmlns:r="http://schemas.openxmlformats.org/officeDocument/2006/relationships" xmlns:p="http://schemas.openxmlformats.org/presentationml/2006/main">
+  <p:cSld>
+    <p:spTree>
+      <p:nvGrpSpPr>
+        <p:cNvPr id="1" name=""/>
+        <p:cNvGrpSpPr/>
+        <p:nvPr/>
+      </p:nvGrpSpPr>
+      <p:grpSpPr>
+        <a:xfrm>
+          <a:off x="0" y="0"/>
+          <a:ext cx="0" cy="0"/>
+          <a:chOff x="0" y="0"/>
+          <a:chExt cx="0" cy="0"/>
+        </a:xfrm>
+      </p:grpSpPr>
+      <p:sp>
+        <p:nvSpPr>
+          <p:cNvPr id="2" name="Title 1"/>
+          <p:cNvSpPr>
+            <a:spLocks noGrp="1"/>
+          </p:cNvSpPr>
+          <p:nvPr>
+            <p:ph type="title"/>
+          </p:nvPr>
+        </p:nvSpPr>
+        <p:spPr/>
+        <p:txBody>
+          <a:bodyPr/>
+          <a:lstStyle/>
+          <a:p>
+            <a:r>
               <a:rPr lang="en-GB" dirty="0" err="1"/>
               <a:t>Vm</a:t>
             </a:r>
@@ -16071,7 +17102,7 @@
 </p:sld>
 </file>
 
-<file path=ppt/slides/slide7.xml><?xml version="1.0" encoding="utf-8"?>
+<file path=ppt/slides/slide8.xml><?xml version="1.0" encoding="utf-8"?>
 <p:sld xmlns:a="http://schemas.openxmlformats.org/drawingml/2006/main" xmlns:r="http://schemas.openxmlformats.org/officeDocument/2006/relationships" xmlns:p="http://schemas.openxmlformats.org/presentationml/2006/main">
   <p:cSld>
     <p:spTree>
@@ -16202,88 +17233,6 @@
     <p:extLst>
       <p:ext uri="{BB962C8B-B14F-4D97-AF65-F5344CB8AC3E}">
         <p14:creationId xmlns:p14="http://schemas.microsoft.com/office/powerpoint/2010/main" val="3536510317"/>
-      </p:ext>
-    </p:extLst>
-  </p:cSld>
-  <p:clrMapOvr>
-    <a:masterClrMapping/>
-  </p:clrMapOvr>
-</p:sld>
-</file>
-
-<file path=ppt/slides/slide8.xml><?xml version="1.0" encoding="utf-8"?>
-<p:sld xmlns:a="http://schemas.openxmlformats.org/drawingml/2006/main" xmlns:r="http://schemas.openxmlformats.org/officeDocument/2006/relationships" xmlns:p="http://schemas.openxmlformats.org/presentationml/2006/main">
-  <p:cSld>
-    <p:spTree>
-      <p:nvGrpSpPr>
-        <p:cNvPr id="1" name=""/>
-        <p:cNvGrpSpPr/>
-        <p:nvPr/>
-      </p:nvGrpSpPr>
-      <p:grpSpPr>
-        <a:xfrm>
-          <a:off x="0" y="0"/>
-          <a:ext cx="0" cy="0"/>
-          <a:chOff x="0" y="0"/>
-          <a:chExt cx="0" cy="0"/>
-        </a:xfrm>
-      </p:grpSpPr>
-      <p:sp>
-        <p:nvSpPr>
-          <p:cNvPr id="2" name="Title 1"/>
-          <p:cNvSpPr>
-            <a:spLocks noGrp="1"/>
-          </p:cNvSpPr>
-          <p:nvPr>
-            <p:ph type="title"/>
-          </p:nvPr>
-        </p:nvSpPr>
-        <p:spPr/>
-        <p:txBody>
-          <a:bodyPr/>
-          <a:lstStyle/>
-          <a:p>
-            <a:r>
-              <a:rPr lang="en-GB" dirty="0"/>
-              <a:t>Docker archıtecture</a:t>
-            </a:r>
-            <a:endParaRPr lang="tr-TR" dirty="0"/>
-          </a:p>
-        </p:txBody>
-      </p:sp>
-      <p:pic>
-        <p:nvPicPr>
-          <p:cNvPr id="4" name="Content Placeholder 3"/>
-          <p:cNvPicPr>
-            <a:picLocks noGrp="1" noChangeAspect="1"/>
-          </p:cNvPicPr>
-          <p:nvPr>
-            <p:ph idx="1"/>
-          </p:nvPr>
-        </p:nvPicPr>
-        <p:blipFill>
-          <a:blip r:embed="rId2">
-            <a:extLst>
-              <a:ext uri="{28A0092B-C50C-407E-A947-70E740481C1C}">
-                <a14:useLocalDpi xmlns:a14="http://schemas.microsoft.com/office/drawing/2010/main" val="0"/>
-              </a:ext>
-            </a:extLst>
-          </a:blip>
-          <a:stretch>
-            <a:fillRect/>
-          </a:stretch>
-        </p:blipFill>
-        <p:spPr>
-          <a:xfrm>
-            <a:off x="2749051" y="2249488"/>
-            <a:ext cx="6690723" cy="3541712"/>
-          </a:xfrm>
-        </p:spPr>
-      </p:pic>
-    </p:spTree>
-    <p:extLst>
-      <p:ext uri="{BB962C8B-B14F-4D97-AF65-F5344CB8AC3E}">
-        <p14:creationId xmlns:p14="http://schemas.microsoft.com/office/powerpoint/2010/main" val="332515024"/>
       </p:ext>
     </p:extLst>
   </p:cSld>
@@ -16327,112 +17276,45 @@
           <a:p>
             <a:r>
               <a:rPr lang="en-GB" dirty="0"/>
-              <a:t>Docker </a:t>
-            </a:r>
-            <a:r>
-              <a:rPr lang="en-GB" dirty="0" err="1"/>
-              <a:t>ınstallatıon</a:t>
+              <a:t>Docker archıtecture</a:t>
             </a:r>
             <a:endParaRPr lang="tr-TR" dirty="0"/>
           </a:p>
         </p:txBody>
       </p:sp>
-      <p:sp>
-        <p:nvSpPr>
-          <p:cNvPr id="5" name="Content Placeholder 4">
+      <p:pic>
+        <p:nvPicPr>
+          <p:cNvPr id="4" name="Content Placeholder 3"/>
+          <p:cNvPicPr>
+            <a:picLocks noGrp="1" noChangeAspect="1"/>
+          </p:cNvPicPr>
+          <p:nvPr>
+            <p:ph idx="1"/>
+          </p:nvPr>
+        </p:nvPicPr>
+        <p:blipFill>
+          <a:blip r:embed="rId2">
             <a:extLst>
-              <a:ext uri="{FF2B5EF4-FFF2-40B4-BE49-F238E27FC236}">
-                <a16:creationId xmlns:a16="http://schemas.microsoft.com/office/drawing/2014/main" id="{27C75E71-562A-4F8E-BB27-1143F98C3E85}"/>
+              <a:ext uri="{28A0092B-C50C-407E-A947-70E740481C1C}">
+                <a14:useLocalDpi xmlns:a14="http://schemas.microsoft.com/office/drawing/2010/main" val="0"/>
               </a:ext>
             </a:extLst>
-          </p:cNvPr>
-          <p:cNvSpPr>
-            <a:spLocks noGrp="1"/>
-          </p:cNvSpPr>
-          <p:nvPr>
-            <p:ph idx="1"/>
-          </p:nvPr>
-        </p:nvSpPr>
+          </a:blip>
+          <a:stretch>
+            <a:fillRect/>
+          </a:stretch>
+        </p:blipFill>
         <p:spPr>
           <a:xfrm>
-            <a:off x="1141412" y="2146300"/>
-            <a:ext cx="10191996" cy="4093182"/>
+            <a:off x="2749051" y="2249488"/>
+            <a:ext cx="6690723" cy="3541712"/>
           </a:xfrm>
         </p:spPr>
-        <p:txBody>
-          <a:bodyPr>
-            <a:normAutofit fontScale="92500" lnSpcReduction="20000"/>
-          </a:bodyPr>
-          <a:lstStyle/>
-          <a:p>
-            <a:r>
-              <a:rPr lang="en-US" dirty="0">
-                <a:hlinkClick r:id="rId2"/>
-              </a:rPr>
-              <a:t>https://store.docker.com/</a:t>
-            </a:r>
-            <a:endParaRPr lang="en-US" dirty="0"/>
-          </a:p>
-          <a:p>
-            <a:r>
-              <a:rPr lang="en-US" dirty="0"/>
-              <a:t>Mac , Windows, Centos, Debian, Fedora, Ubuntu, Raspberry Pi</a:t>
-            </a:r>
-          </a:p>
-          <a:p>
-            <a:r>
-              <a:rPr lang="en-US" dirty="0"/>
-              <a:t>Direct: Linux, W. Server 2016 / Indirect: Windows 10 Pro/Ent (Hyper-V), Mac (</a:t>
-            </a:r>
-            <a:r>
-              <a:rPr lang="en-US" dirty="0" err="1"/>
-              <a:t>HyperKit</a:t>
-            </a:r>
-            <a:r>
-              <a:rPr lang="en-US" dirty="0"/>
-              <a:t>)</a:t>
-            </a:r>
-          </a:p>
-          <a:p>
-            <a:r>
-              <a:rPr lang="en-US" dirty="0"/>
-              <a:t>Windows 7/8/8.1, Older versions of Mac or Window 10 Home (Docker Toolbox)</a:t>
-            </a:r>
-          </a:p>
-          <a:p>
-            <a:r>
-              <a:rPr lang="en-US" dirty="0"/>
-              <a:t>IaaS (AWS, Azure)</a:t>
-            </a:r>
-          </a:p>
-          <a:p>
-            <a:r>
-              <a:rPr lang="en-US" dirty="0" err="1"/>
-              <a:t>DockerCloud</a:t>
-            </a:r>
-            <a:r>
-              <a:rPr lang="en-US" dirty="0"/>
-              <a:t> (1 free private repo)</a:t>
-            </a:r>
-          </a:p>
-          <a:p>
-            <a:r>
-              <a:rPr lang="en-US" dirty="0"/>
-              <a:t>Visual Studio Code (Recommended)</a:t>
-            </a:r>
-          </a:p>
-          <a:p>
-            <a:r>
-              <a:rPr lang="en-US" dirty="0"/>
-              <a:t>https://labs.play-with-docker.com/</a:t>
-            </a:r>
-          </a:p>
-        </p:txBody>
-      </p:sp>
+      </p:pic>
     </p:spTree>
     <p:extLst>
       <p:ext uri="{BB962C8B-B14F-4D97-AF65-F5344CB8AC3E}">
-        <p14:creationId xmlns:p14="http://schemas.microsoft.com/office/powerpoint/2010/main" val="3378640103"/>
+        <p14:creationId xmlns:p14="http://schemas.microsoft.com/office/powerpoint/2010/main" val="332515024"/>
       </p:ext>
     </p:extLst>
   </p:cSld>

</xml_diff>